<commit_message>
Lots of small fixes and additions in Chapter 4 (Input Output)
</commit_message>
<xml_diff>
--- a/resources/images/Chapter-4-Console-Input-Output/graphics/Presentation2.pptx
+++ b/resources/images/Chapter-4-Console-Input-Output/graphics/Presentation2.pptx
@@ -6,6 +6,7 @@
   </p:sldMasterIdLst>
   <p:sldIdLst>
     <p:sldId id="256" r:id="rId2"/>
+    <p:sldId id="257" r:id="rId3"/>
   </p:sldIdLst>
   <p:sldSz cx="9144000" cy="6858000" type="screen4x3"/>
   <p:notesSz cx="6858000" cy="9144000"/>
@@ -13,92 +14,122 @@
     <a:defPPr>
       <a:defRPr lang="bg-BG"/>
     </a:defPPr>
-    <a:lvl1pPr marL="0" algn="l" defTabSz="914400" rtl="0" eaLnBrk="1" latinLnBrk="0" hangingPunct="1">
-      <a:defRPr sz="1800" kern="1200">
+    <a:lvl1pPr algn="l" rtl="0" fontAlgn="base">
+      <a:spcBef>
+        <a:spcPct val="0"/>
+      </a:spcBef>
+      <a:spcAft>
+        <a:spcPct val="0"/>
+      </a:spcAft>
+      <a:defRPr kern="1200">
         <a:solidFill>
           <a:schemeClr val="tx1"/>
         </a:solidFill>
-        <a:latin typeface="+mn-lt"/>
+        <a:latin typeface="Arial" charset="0"/>
         <a:ea typeface="+mn-ea"/>
         <a:cs typeface="+mn-cs"/>
       </a:defRPr>
     </a:lvl1pPr>
-    <a:lvl2pPr marL="457200" algn="l" defTabSz="914400" rtl="0" eaLnBrk="1" latinLnBrk="0" hangingPunct="1">
-      <a:defRPr sz="1800" kern="1200">
+    <a:lvl2pPr marL="457200" algn="l" rtl="0" fontAlgn="base">
+      <a:spcBef>
+        <a:spcPct val="0"/>
+      </a:spcBef>
+      <a:spcAft>
+        <a:spcPct val="0"/>
+      </a:spcAft>
+      <a:defRPr kern="1200">
         <a:solidFill>
           <a:schemeClr val="tx1"/>
         </a:solidFill>
-        <a:latin typeface="+mn-lt"/>
+        <a:latin typeface="Arial" charset="0"/>
         <a:ea typeface="+mn-ea"/>
         <a:cs typeface="+mn-cs"/>
       </a:defRPr>
     </a:lvl2pPr>
-    <a:lvl3pPr marL="914400" algn="l" defTabSz="914400" rtl="0" eaLnBrk="1" latinLnBrk="0" hangingPunct="1">
-      <a:defRPr sz="1800" kern="1200">
+    <a:lvl3pPr marL="914400" algn="l" rtl="0" fontAlgn="base">
+      <a:spcBef>
+        <a:spcPct val="0"/>
+      </a:spcBef>
+      <a:spcAft>
+        <a:spcPct val="0"/>
+      </a:spcAft>
+      <a:defRPr kern="1200">
         <a:solidFill>
           <a:schemeClr val="tx1"/>
         </a:solidFill>
-        <a:latin typeface="+mn-lt"/>
+        <a:latin typeface="Arial" charset="0"/>
         <a:ea typeface="+mn-ea"/>
         <a:cs typeface="+mn-cs"/>
       </a:defRPr>
     </a:lvl3pPr>
-    <a:lvl4pPr marL="1371600" algn="l" defTabSz="914400" rtl="0" eaLnBrk="1" latinLnBrk="0" hangingPunct="1">
-      <a:defRPr sz="1800" kern="1200">
+    <a:lvl4pPr marL="1371600" algn="l" rtl="0" fontAlgn="base">
+      <a:spcBef>
+        <a:spcPct val="0"/>
+      </a:spcBef>
+      <a:spcAft>
+        <a:spcPct val="0"/>
+      </a:spcAft>
+      <a:defRPr kern="1200">
         <a:solidFill>
           <a:schemeClr val="tx1"/>
         </a:solidFill>
-        <a:latin typeface="+mn-lt"/>
+        <a:latin typeface="Arial" charset="0"/>
         <a:ea typeface="+mn-ea"/>
         <a:cs typeface="+mn-cs"/>
       </a:defRPr>
     </a:lvl4pPr>
-    <a:lvl5pPr marL="1828800" algn="l" defTabSz="914400" rtl="0" eaLnBrk="1" latinLnBrk="0" hangingPunct="1">
-      <a:defRPr sz="1800" kern="1200">
+    <a:lvl5pPr marL="1828800" algn="l" rtl="0" fontAlgn="base">
+      <a:spcBef>
+        <a:spcPct val="0"/>
+      </a:spcBef>
+      <a:spcAft>
+        <a:spcPct val="0"/>
+      </a:spcAft>
+      <a:defRPr kern="1200">
         <a:solidFill>
           <a:schemeClr val="tx1"/>
         </a:solidFill>
-        <a:latin typeface="+mn-lt"/>
+        <a:latin typeface="Arial" charset="0"/>
         <a:ea typeface="+mn-ea"/>
         <a:cs typeface="+mn-cs"/>
       </a:defRPr>
     </a:lvl5pPr>
     <a:lvl6pPr marL="2286000" algn="l" defTabSz="914400" rtl="0" eaLnBrk="1" latinLnBrk="0" hangingPunct="1">
-      <a:defRPr sz="1800" kern="1200">
+      <a:defRPr kern="1200">
         <a:solidFill>
           <a:schemeClr val="tx1"/>
         </a:solidFill>
-        <a:latin typeface="+mn-lt"/>
+        <a:latin typeface="Arial" charset="0"/>
         <a:ea typeface="+mn-ea"/>
         <a:cs typeface="+mn-cs"/>
       </a:defRPr>
     </a:lvl6pPr>
     <a:lvl7pPr marL="2743200" algn="l" defTabSz="914400" rtl="0" eaLnBrk="1" latinLnBrk="0" hangingPunct="1">
-      <a:defRPr sz="1800" kern="1200">
+      <a:defRPr kern="1200">
         <a:solidFill>
           <a:schemeClr val="tx1"/>
         </a:solidFill>
-        <a:latin typeface="+mn-lt"/>
+        <a:latin typeface="Arial" charset="0"/>
         <a:ea typeface="+mn-ea"/>
         <a:cs typeface="+mn-cs"/>
       </a:defRPr>
     </a:lvl7pPr>
     <a:lvl8pPr marL="3200400" algn="l" defTabSz="914400" rtl="0" eaLnBrk="1" latinLnBrk="0" hangingPunct="1">
-      <a:defRPr sz="1800" kern="1200">
+      <a:defRPr kern="1200">
         <a:solidFill>
           <a:schemeClr val="tx1"/>
         </a:solidFill>
-        <a:latin typeface="+mn-lt"/>
+        <a:latin typeface="Arial" charset="0"/>
         <a:ea typeface="+mn-ea"/>
         <a:cs typeface="+mn-cs"/>
       </a:defRPr>
     </a:lvl8pPr>
     <a:lvl9pPr marL="3657600" algn="l" defTabSz="914400" rtl="0" eaLnBrk="1" latinLnBrk="0" hangingPunct="1">
-      <a:defRPr sz="1800" kern="1200">
+      <a:defRPr kern="1200">
         <a:solidFill>
           <a:schemeClr val="tx1"/>
         </a:solidFill>
-        <a:latin typeface="+mn-lt"/>
+        <a:latin typeface="Arial" charset="0"/>
         <a:ea typeface="+mn-ea"/>
         <a:cs typeface="+mn-cs"/>
       </a:defRPr>
@@ -284,12 +315,21 @@
         <p:spPr/>
         <p:txBody>
           <a:bodyPr/>
-          <a:lstStyle/>
-          <a:p>
-            <a:fld id="{A8A3ED52-B0A0-418D-BE85-E9E3ED0F4A41}" type="datetimeFigureOut">
-              <a:rPr lang="bg-BG" smtClean="0"/>
-              <a:pPr/>
-              <a:t>26.8.2008 г.</a:t>
+          <a:lstStyle>
+            <a:lvl1pPr>
+              <a:defRPr/>
+            </a:lvl1pPr>
+          </a:lstStyle>
+          <a:p>
+            <a:pPr>
+              <a:defRPr/>
+            </a:pPr>
+            <a:fld id="{3D48C804-4CA3-47E3-B987-D30CB1B71DA2}" type="datetimeFigureOut">
+              <a:rPr lang="bg-BG"/>
+              <a:pPr>
+                <a:defRPr/>
+              </a:pPr>
+              <a:t>29.11.2008 г.</a:t>
             </a:fld>
             <a:endParaRPr lang="bg-BG"/>
           </a:p>
@@ -308,8 +348,15 @@
         <p:spPr/>
         <p:txBody>
           <a:bodyPr/>
-          <a:lstStyle/>
-          <a:p>
+          <a:lstStyle>
+            <a:lvl1pPr>
+              <a:defRPr/>
+            </a:lvl1pPr>
+          </a:lstStyle>
+          <a:p>
+            <a:pPr>
+              <a:defRPr/>
+            </a:pPr>
             <a:endParaRPr lang="bg-BG"/>
           </a:p>
         </p:txBody>
@@ -327,11 +374,20 @@
         <p:spPr/>
         <p:txBody>
           <a:bodyPr/>
-          <a:lstStyle/>
-          <a:p>
-            <a:fld id="{25D8A718-BF1E-4B5B-A668-D4038EA4A2AA}" type="slidenum">
-              <a:rPr lang="bg-BG" smtClean="0"/>
-              <a:pPr/>
+          <a:lstStyle>
+            <a:lvl1pPr>
+              <a:defRPr/>
+            </a:lvl1pPr>
+          </a:lstStyle>
+          <a:p>
+            <a:pPr>
+              <a:defRPr/>
+            </a:pPr>
+            <a:fld id="{B87EA790-5D1A-427D-AC9B-B89B5B700548}" type="slidenum">
+              <a:rPr lang="bg-BG"/>
+              <a:pPr>
+                <a:defRPr/>
+              </a:pPr>
               <a:t>‹#›</a:t>
             </a:fld>
             <a:endParaRPr lang="bg-BG"/>
@@ -451,12 +507,21 @@
         <p:spPr/>
         <p:txBody>
           <a:bodyPr/>
-          <a:lstStyle/>
-          <a:p>
-            <a:fld id="{A8A3ED52-B0A0-418D-BE85-E9E3ED0F4A41}" type="datetimeFigureOut">
-              <a:rPr lang="bg-BG" smtClean="0"/>
-              <a:pPr/>
-              <a:t>26.8.2008 г.</a:t>
+          <a:lstStyle>
+            <a:lvl1pPr>
+              <a:defRPr/>
+            </a:lvl1pPr>
+          </a:lstStyle>
+          <a:p>
+            <a:pPr>
+              <a:defRPr/>
+            </a:pPr>
+            <a:fld id="{12FC34F2-32EF-4923-9F69-7E2B4E65EDE3}" type="datetimeFigureOut">
+              <a:rPr lang="bg-BG"/>
+              <a:pPr>
+                <a:defRPr/>
+              </a:pPr>
+              <a:t>29.11.2008 г.</a:t>
             </a:fld>
             <a:endParaRPr lang="bg-BG"/>
           </a:p>
@@ -475,8 +540,15 @@
         <p:spPr/>
         <p:txBody>
           <a:bodyPr/>
-          <a:lstStyle/>
-          <a:p>
+          <a:lstStyle>
+            <a:lvl1pPr>
+              <a:defRPr/>
+            </a:lvl1pPr>
+          </a:lstStyle>
+          <a:p>
+            <a:pPr>
+              <a:defRPr/>
+            </a:pPr>
             <a:endParaRPr lang="bg-BG"/>
           </a:p>
         </p:txBody>
@@ -494,11 +566,20 @@
         <p:spPr/>
         <p:txBody>
           <a:bodyPr/>
-          <a:lstStyle/>
-          <a:p>
-            <a:fld id="{25D8A718-BF1E-4B5B-A668-D4038EA4A2AA}" type="slidenum">
-              <a:rPr lang="bg-BG" smtClean="0"/>
-              <a:pPr/>
+          <a:lstStyle>
+            <a:lvl1pPr>
+              <a:defRPr/>
+            </a:lvl1pPr>
+          </a:lstStyle>
+          <a:p>
+            <a:pPr>
+              <a:defRPr/>
+            </a:pPr>
+            <a:fld id="{533ACA2F-33E7-4F14-A28A-761B5CA60B84}" type="slidenum">
+              <a:rPr lang="bg-BG"/>
+              <a:pPr>
+                <a:defRPr/>
+              </a:pPr>
               <a:t>‹#›</a:t>
             </a:fld>
             <a:endParaRPr lang="bg-BG"/>
@@ -628,12 +709,21 @@
         <p:spPr/>
         <p:txBody>
           <a:bodyPr/>
-          <a:lstStyle/>
-          <a:p>
-            <a:fld id="{A8A3ED52-B0A0-418D-BE85-E9E3ED0F4A41}" type="datetimeFigureOut">
-              <a:rPr lang="bg-BG" smtClean="0"/>
-              <a:pPr/>
-              <a:t>26.8.2008 г.</a:t>
+          <a:lstStyle>
+            <a:lvl1pPr>
+              <a:defRPr/>
+            </a:lvl1pPr>
+          </a:lstStyle>
+          <a:p>
+            <a:pPr>
+              <a:defRPr/>
+            </a:pPr>
+            <a:fld id="{5A47A59D-0E32-4F2C-9ACD-9184AF3AF24B}" type="datetimeFigureOut">
+              <a:rPr lang="bg-BG"/>
+              <a:pPr>
+                <a:defRPr/>
+              </a:pPr>
+              <a:t>29.11.2008 г.</a:t>
             </a:fld>
             <a:endParaRPr lang="bg-BG"/>
           </a:p>
@@ -652,8 +742,15 @@
         <p:spPr/>
         <p:txBody>
           <a:bodyPr/>
-          <a:lstStyle/>
-          <a:p>
+          <a:lstStyle>
+            <a:lvl1pPr>
+              <a:defRPr/>
+            </a:lvl1pPr>
+          </a:lstStyle>
+          <a:p>
+            <a:pPr>
+              <a:defRPr/>
+            </a:pPr>
             <a:endParaRPr lang="bg-BG"/>
           </a:p>
         </p:txBody>
@@ -671,11 +768,20 @@
         <p:spPr/>
         <p:txBody>
           <a:bodyPr/>
-          <a:lstStyle/>
-          <a:p>
-            <a:fld id="{25D8A718-BF1E-4B5B-A668-D4038EA4A2AA}" type="slidenum">
-              <a:rPr lang="bg-BG" smtClean="0"/>
-              <a:pPr/>
+          <a:lstStyle>
+            <a:lvl1pPr>
+              <a:defRPr/>
+            </a:lvl1pPr>
+          </a:lstStyle>
+          <a:p>
+            <a:pPr>
+              <a:defRPr/>
+            </a:pPr>
+            <a:fld id="{1E07465B-09FB-4889-AD04-3FBA318E94C5}" type="slidenum">
+              <a:rPr lang="bg-BG"/>
+              <a:pPr>
+                <a:defRPr/>
+              </a:pPr>
               <a:t>‹#›</a:t>
             </a:fld>
             <a:endParaRPr lang="bg-BG"/>
@@ -795,12 +901,21 @@
         <p:spPr/>
         <p:txBody>
           <a:bodyPr/>
-          <a:lstStyle/>
-          <a:p>
-            <a:fld id="{A8A3ED52-B0A0-418D-BE85-E9E3ED0F4A41}" type="datetimeFigureOut">
-              <a:rPr lang="bg-BG" smtClean="0"/>
-              <a:pPr/>
-              <a:t>26.8.2008 г.</a:t>
+          <a:lstStyle>
+            <a:lvl1pPr>
+              <a:defRPr/>
+            </a:lvl1pPr>
+          </a:lstStyle>
+          <a:p>
+            <a:pPr>
+              <a:defRPr/>
+            </a:pPr>
+            <a:fld id="{974B7378-D8C5-4BE1-BEAC-443D14B8911D}" type="datetimeFigureOut">
+              <a:rPr lang="bg-BG"/>
+              <a:pPr>
+                <a:defRPr/>
+              </a:pPr>
+              <a:t>29.11.2008 г.</a:t>
             </a:fld>
             <a:endParaRPr lang="bg-BG"/>
           </a:p>
@@ -819,8 +934,15 @@
         <p:spPr/>
         <p:txBody>
           <a:bodyPr/>
-          <a:lstStyle/>
-          <a:p>
+          <a:lstStyle>
+            <a:lvl1pPr>
+              <a:defRPr/>
+            </a:lvl1pPr>
+          </a:lstStyle>
+          <a:p>
+            <a:pPr>
+              <a:defRPr/>
+            </a:pPr>
             <a:endParaRPr lang="bg-BG"/>
           </a:p>
         </p:txBody>
@@ -838,11 +960,20 @@
         <p:spPr/>
         <p:txBody>
           <a:bodyPr/>
-          <a:lstStyle/>
-          <a:p>
-            <a:fld id="{25D8A718-BF1E-4B5B-A668-D4038EA4A2AA}" type="slidenum">
-              <a:rPr lang="bg-BG" smtClean="0"/>
-              <a:pPr/>
+          <a:lstStyle>
+            <a:lvl1pPr>
+              <a:defRPr/>
+            </a:lvl1pPr>
+          </a:lstStyle>
+          <a:p>
+            <a:pPr>
+              <a:defRPr/>
+            </a:pPr>
+            <a:fld id="{34292558-3BFA-4112-B5B8-54B5A67C36A3}" type="slidenum">
+              <a:rPr lang="bg-BG"/>
+              <a:pPr>
+                <a:defRPr/>
+              </a:pPr>
               <a:t>‹#›</a:t>
             </a:fld>
             <a:endParaRPr lang="bg-BG"/>
@@ -1038,12 +1169,21 @@
         <p:spPr/>
         <p:txBody>
           <a:bodyPr/>
-          <a:lstStyle/>
-          <a:p>
-            <a:fld id="{A8A3ED52-B0A0-418D-BE85-E9E3ED0F4A41}" type="datetimeFigureOut">
-              <a:rPr lang="bg-BG" smtClean="0"/>
-              <a:pPr/>
-              <a:t>26.8.2008 г.</a:t>
+          <a:lstStyle>
+            <a:lvl1pPr>
+              <a:defRPr/>
+            </a:lvl1pPr>
+          </a:lstStyle>
+          <a:p>
+            <a:pPr>
+              <a:defRPr/>
+            </a:pPr>
+            <a:fld id="{90DFD699-D4B6-4337-BF9A-DC0B14E3AFB3}" type="datetimeFigureOut">
+              <a:rPr lang="bg-BG"/>
+              <a:pPr>
+                <a:defRPr/>
+              </a:pPr>
+              <a:t>29.11.2008 г.</a:t>
             </a:fld>
             <a:endParaRPr lang="bg-BG"/>
           </a:p>
@@ -1062,8 +1202,15 @@
         <p:spPr/>
         <p:txBody>
           <a:bodyPr/>
-          <a:lstStyle/>
-          <a:p>
+          <a:lstStyle>
+            <a:lvl1pPr>
+              <a:defRPr/>
+            </a:lvl1pPr>
+          </a:lstStyle>
+          <a:p>
+            <a:pPr>
+              <a:defRPr/>
+            </a:pPr>
             <a:endParaRPr lang="bg-BG"/>
           </a:p>
         </p:txBody>
@@ -1081,11 +1228,20 @@
         <p:spPr/>
         <p:txBody>
           <a:bodyPr/>
-          <a:lstStyle/>
-          <a:p>
-            <a:fld id="{25D8A718-BF1E-4B5B-A668-D4038EA4A2AA}" type="slidenum">
-              <a:rPr lang="bg-BG" smtClean="0"/>
-              <a:pPr/>
+          <a:lstStyle>
+            <a:lvl1pPr>
+              <a:defRPr/>
+            </a:lvl1pPr>
+          </a:lstStyle>
+          <a:p>
+            <a:pPr>
+              <a:defRPr/>
+            </a:pPr>
+            <a:fld id="{A7277E9C-963D-4011-BD8C-9AD129486B23}" type="slidenum">
+              <a:rPr lang="bg-BG"/>
+              <a:pPr>
+                <a:defRPr/>
+              </a:pPr>
               <a:t>‹#›</a:t>
             </a:fld>
             <a:endParaRPr lang="bg-BG"/>
@@ -1312,7 +1468,7 @@
       </p:sp>
       <p:sp>
         <p:nvSpPr>
-          <p:cNvPr id="5" name="Date Placeholder 4"/>
+          <p:cNvPr id="5" name="Date Placeholder 3"/>
           <p:cNvSpPr>
             <a:spLocks noGrp="1"/>
           </p:cNvSpPr>
@@ -1323,12 +1479,21 @@
         <p:spPr/>
         <p:txBody>
           <a:bodyPr/>
-          <a:lstStyle/>
-          <a:p>
-            <a:fld id="{A8A3ED52-B0A0-418D-BE85-E9E3ED0F4A41}" type="datetimeFigureOut">
-              <a:rPr lang="bg-BG" smtClean="0"/>
-              <a:pPr/>
-              <a:t>26.8.2008 г.</a:t>
+          <a:lstStyle>
+            <a:lvl1pPr>
+              <a:defRPr/>
+            </a:lvl1pPr>
+          </a:lstStyle>
+          <a:p>
+            <a:pPr>
+              <a:defRPr/>
+            </a:pPr>
+            <a:fld id="{62534C03-5BB0-4650-A7BC-ED27787F4677}" type="datetimeFigureOut">
+              <a:rPr lang="bg-BG"/>
+              <a:pPr>
+                <a:defRPr/>
+              </a:pPr>
+              <a:t>29.11.2008 г.</a:t>
             </a:fld>
             <a:endParaRPr lang="bg-BG"/>
           </a:p>
@@ -1336,7 +1501,7 @@
       </p:sp>
       <p:sp>
         <p:nvSpPr>
-          <p:cNvPr id="6" name="Footer Placeholder 5"/>
+          <p:cNvPr id="6" name="Footer Placeholder 4"/>
           <p:cNvSpPr>
             <a:spLocks noGrp="1"/>
           </p:cNvSpPr>
@@ -1347,15 +1512,22 @@
         <p:spPr/>
         <p:txBody>
           <a:bodyPr/>
-          <a:lstStyle/>
-          <a:p>
-            <a:endParaRPr lang="bg-BG"/>
-          </a:p>
-        </p:txBody>
-      </p:sp>
-      <p:sp>
-        <p:nvSpPr>
-          <p:cNvPr id="7" name="Slide Number Placeholder 6"/>
+          <a:lstStyle>
+            <a:lvl1pPr>
+              <a:defRPr/>
+            </a:lvl1pPr>
+          </a:lstStyle>
+          <a:p>
+            <a:pPr>
+              <a:defRPr/>
+            </a:pPr>
+            <a:endParaRPr lang="bg-BG"/>
+          </a:p>
+        </p:txBody>
+      </p:sp>
+      <p:sp>
+        <p:nvSpPr>
+          <p:cNvPr id="7" name="Slide Number Placeholder 5"/>
           <p:cNvSpPr>
             <a:spLocks noGrp="1"/>
           </p:cNvSpPr>
@@ -1366,11 +1538,20 @@
         <p:spPr/>
         <p:txBody>
           <a:bodyPr/>
-          <a:lstStyle/>
-          <a:p>
-            <a:fld id="{25D8A718-BF1E-4B5B-A668-D4038EA4A2AA}" type="slidenum">
-              <a:rPr lang="bg-BG" smtClean="0"/>
-              <a:pPr/>
+          <a:lstStyle>
+            <a:lvl1pPr>
+              <a:defRPr/>
+            </a:lvl1pPr>
+          </a:lstStyle>
+          <a:p>
+            <a:pPr>
+              <a:defRPr/>
+            </a:pPr>
+            <a:fld id="{69C017CF-B0C0-4BDB-B08D-37E9876C68B0}" type="slidenum">
+              <a:rPr lang="bg-BG"/>
+              <a:pPr>
+                <a:defRPr/>
+              </a:pPr>
               <a:t>‹#›</a:t>
             </a:fld>
             <a:endParaRPr lang="bg-BG"/>
@@ -1731,7 +1912,7 @@
       </p:sp>
       <p:sp>
         <p:nvSpPr>
-          <p:cNvPr id="7" name="Date Placeholder 6"/>
+          <p:cNvPr id="7" name="Date Placeholder 3"/>
           <p:cNvSpPr>
             <a:spLocks noGrp="1"/>
           </p:cNvSpPr>
@@ -1742,12 +1923,21 @@
         <p:spPr/>
         <p:txBody>
           <a:bodyPr/>
-          <a:lstStyle/>
-          <a:p>
-            <a:fld id="{A8A3ED52-B0A0-418D-BE85-E9E3ED0F4A41}" type="datetimeFigureOut">
-              <a:rPr lang="bg-BG" smtClean="0"/>
-              <a:pPr/>
-              <a:t>26.8.2008 г.</a:t>
+          <a:lstStyle>
+            <a:lvl1pPr>
+              <a:defRPr/>
+            </a:lvl1pPr>
+          </a:lstStyle>
+          <a:p>
+            <a:pPr>
+              <a:defRPr/>
+            </a:pPr>
+            <a:fld id="{0445FAC4-788B-4DCF-B7BF-7C2CA20713BF}" type="datetimeFigureOut">
+              <a:rPr lang="bg-BG"/>
+              <a:pPr>
+                <a:defRPr/>
+              </a:pPr>
+              <a:t>29.11.2008 г.</a:t>
             </a:fld>
             <a:endParaRPr lang="bg-BG"/>
           </a:p>
@@ -1755,7 +1945,7 @@
       </p:sp>
       <p:sp>
         <p:nvSpPr>
-          <p:cNvPr id="8" name="Footer Placeholder 7"/>
+          <p:cNvPr id="8" name="Footer Placeholder 4"/>
           <p:cNvSpPr>
             <a:spLocks noGrp="1"/>
           </p:cNvSpPr>
@@ -1766,15 +1956,22 @@
         <p:spPr/>
         <p:txBody>
           <a:bodyPr/>
-          <a:lstStyle/>
-          <a:p>
-            <a:endParaRPr lang="bg-BG"/>
-          </a:p>
-        </p:txBody>
-      </p:sp>
-      <p:sp>
-        <p:nvSpPr>
-          <p:cNvPr id="9" name="Slide Number Placeholder 8"/>
+          <a:lstStyle>
+            <a:lvl1pPr>
+              <a:defRPr/>
+            </a:lvl1pPr>
+          </a:lstStyle>
+          <a:p>
+            <a:pPr>
+              <a:defRPr/>
+            </a:pPr>
+            <a:endParaRPr lang="bg-BG"/>
+          </a:p>
+        </p:txBody>
+      </p:sp>
+      <p:sp>
+        <p:nvSpPr>
+          <p:cNvPr id="9" name="Slide Number Placeholder 5"/>
           <p:cNvSpPr>
             <a:spLocks noGrp="1"/>
           </p:cNvSpPr>
@@ -1785,11 +1982,20 @@
         <p:spPr/>
         <p:txBody>
           <a:bodyPr/>
-          <a:lstStyle/>
-          <a:p>
-            <a:fld id="{25D8A718-BF1E-4B5B-A668-D4038EA4A2AA}" type="slidenum">
-              <a:rPr lang="bg-BG" smtClean="0"/>
-              <a:pPr/>
+          <a:lstStyle>
+            <a:lvl1pPr>
+              <a:defRPr/>
+            </a:lvl1pPr>
+          </a:lstStyle>
+          <a:p>
+            <a:pPr>
+              <a:defRPr/>
+            </a:pPr>
+            <a:fld id="{29B645B4-67D4-40B6-AA6C-9A4685593CFC}" type="slidenum">
+              <a:rPr lang="bg-BG"/>
+              <a:pPr>
+                <a:defRPr/>
+              </a:pPr>
               <a:t>‹#›</a:t>
             </a:fld>
             <a:endParaRPr lang="bg-BG"/>
@@ -1846,7 +2052,7 @@
       </p:sp>
       <p:sp>
         <p:nvSpPr>
-          <p:cNvPr id="3" name="Date Placeholder 2"/>
+          <p:cNvPr id="3" name="Date Placeholder 3"/>
           <p:cNvSpPr>
             <a:spLocks noGrp="1"/>
           </p:cNvSpPr>
@@ -1857,12 +2063,21 @@
         <p:spPr/>
         <p:txBody>
           <a:bodyPr/>
-          <a:lstStyle/>
-          <a:p>
-            <a:fld id="{A8A3ED52-B0A0-418D-BE85-E9E3ED0F4A41}" type="datetimeFigureOut">
-              <a:rPr lang="bg-BG" smtClean="0"/>
-              <a:pPr/>
-              <a:t>26.8.2008 г.</a:t>
+          <a:lstStyle>
+            <a:lvl1pPr>
+              <a:defRPr/>
+            </a:lvl1pPr>
+          </a:lstStyle>
+          <a:p>
+            <a:pPr>
+              <a:defRPr/>
+            </a:pPr>
+            <a:fld id="{473B46DA-6FBD-486B-B211-92D737BC3C2E}" type="datetimeFigureOut">
+              <a:rPr lang="bg-BG"/>
+              <a:pPr>
+                <a:defRPr/>
+              </a:pPr>
+              <a:t>29.11.2008 г.</a:t>
             </a:fld>
             <a:endParaRPr lang="bg-BG"/>
           </a:p>
@@ -1870,7 +2085,7 @@
       </p:sp>
       <p:sp>
         <p:nvSpPr>
-          <p:cNvPr id="4" name="Footer Placeholder 3"/>
+          <p:cNvPr id="4" name="Footer Placeholder 4"/>
           <p:cNvSpPr>
             <a:spLocks noGrp="1"/>
           </p:cNvSpPr>
@@ -1881,15 +2096,22 @@
         <p:spPr/>
         <p:txBody>
           <a:bodyPr/>
-          <a:lstStyle/>
-          <a:p>
-            <a:endParaRPr lang="bg-BG"/>
-          </a:p>
-        </p:txBody>
-      </p:sp>
-      <p:sp>
-        <p:nvSpPr>
-          <p:cNvPr id="5" name="Slide Number Placeholder 4"/>
+          <a:lstStyle>
+            <a:lvl1pPr>
+              <a:defRPr/>
+            </a:lvl1pPr>
+          </a:lstStyle>
+          <a:p>
+            <a:pPr>
+              <a:defRPr/>
+            </a:pPr>
+            <a:endParaRPr lang="bg-BG"/>
+          </a:p>
+        </p:txBody>
+      </p:sp>
+      <p:sp>
+        <p:nvSpPr>
+          <p:cNvPr id="5" name="Slide Number Placeholder 5"/>
           <p:cNvSpPr>
             <a:spLocks noGrp="1"/>
           </p:cNvSpPr>
@@ -1900,11 +2122,20 @@
         <p:spPr/>
         <p:txBody>
           <a:bodyPr/>
-          <a:lstStyle/>
-          <a:p>
-            <a:fld id="{25D8A718-BF1E-4B5B-A668-D4038EA4A2AA}" type="slidenum">
-              <a:rPr lang="bg-BG" smtClean="0"/>
-              <a:pPr/>
+          <a:lstStyle>
+            <a:lvl1pPr>
+              <a:defRPr/>
+            </a:lvl1pPr>
+          </a:lstStyle>
+          <a:p>
+            <a:pPr>
+              <a:defRPr/>
+            </a:pPr>
+            <a:fld id="{B53B68D7-5FE9-4EEF-A887-CEB3E32DDE11}" type="slidenum">
+              <a:rPr lang="bg-BG"/>
+              <a:pPr>
+                <a:defRPr/>
+              </a:pPr>
               <a:t>‹#›</a:t>
             </a:fld>
             <a:endParaRPr lang="bg-BG"/>
@@ -1938,7 +2169,7 @@
       </p:grpSpPr>
       <p:sp>
         <p:nvSpPr>
-          <p:cNvPr id="2" name="Date Placeholder 1"/>
+          <p:cNvPr id="2" name="Date Placeholder 3"/>
           <p:cNvSpPr>
             <a:spLocks noGrp="1"/>
           </p:cNvSpPr>
@@ -1949,12 +2180,21 @@
         <p:spPr/>
         <p:txBody>
           <a:bodyPr/>
-          <a:lstStyle/>
-          <a:p>
-            <a:fld id="{A8A3ED52-B0A0-418D-BE85-E9E3ED0F4A41}" type="datetimeFigureOut">
-              <a:rPr lang="bg-BG" smtClean="0"/>
-              <a:pPr/>
-              <a:t>26.8.2008 г.</a:t>
+          <a:lstStyle>
+            <a:lvl1pPr>
+              <a:defRPr/>
+            </a:lvl1pPr>
+          </a:lstStyle>
+          <a:p>
+            <a:pPr>
+              <a:defRPr/>
+            </a:pPr>
+            <a:fld id="{ABF3E430-206D-43A4-B8BC-6007CB4174AF}" type="datetimeFigureOut">
+              <a:rPr lang="bg-BG"/>
+              <a:pPr>
+                <a:defRPr/>
+              </a:pPr>
+              <a:t>29.11.2008 г.</a:t>
             </a:fld>
             <a:endParaRPr lang="bg-BG"/>
           </a:p>
@@ -1962,7 +2202,7 @@
       </p:sp>
       <p:sp>
         <p:nvSpPr>
-          <p:cNvPr id="3" name="Footer Placeholder 2"/>
+          <p:cNvPr id="3" name="Footer Placeholder 4"/>
           <p:cNvSpPr>
             <a:spLocks noGrp="1"/>
           </p:cNvSpPr>
@@ -1973,15 +2213,22 @@
         <p:spPr/>
         <p:txBody>
           <a:bodyPr/>
-          <a:lstStyle/>
-          <a:p>
-            <a:endParaRPr lang="bg-BG"/>
-          </a:p>
-        </p:txBody>
-      </p:sp>
-      <p:sp>
-        <p:nvSpPr>
-          <p:cNvPr id="4" name="Slide Number Placeholder 3"/>
+          <a:lstStyle>
+            <a:lvl1pPr>
+              <a:defRPr/>
+            </a:lvl1pPr>
+          </a:lstStyle>
+          <a:p>
+            <a:pPr>
+              <a:defRPr/>
+            </a:pPr>
+            <a:endParaRPr lang="bg-BG"/>
+          </a:p>
+        </p:txBody>
+      </p:sp>
+      <p:sp>
+        <p:nvSpPr>
+          <p:cNvPr id="4" name="Slide Number Placeholder 5"/>
           <p:cNvSpPr>
             <a:spLocks noGrp="1"/>
           </p:cNvSpPr>
@@ -1992,11 +2239,20 @@
         <p:spPr/>
         <p:txBody>
           <a:bodyPr/>
-          <a:lstStyle/>
-          <a:p>
-            <a:fld id="{25D8A718-BF1E-4B5B-A668-D4038EA4A2AA}" type="slidenum">
-              <a:rPr lang="bg-BG" smtClean="0"/>
-              <a:pPr/>
+          <a:lstStyle>
+            <a:lvl1pPr>
+              <a:defRPr/>
+            </a:lvl1pPr>
+          </a:lstStyle>
+          <a:p>
+            <a:pPr>
+              <a:defRPr/>
+            </a:pPr>
+            <a:fld id="{B0A38303-D191-42F7-BB90-B094F1B380D9}" type="slidenum">
+              <a:rPr lang="bg-BG"/>
+              <a:pPr>
+                <a:defRPr/>
+              </a:pPr>
               <a:t>‹#›</a:t>
             </a:fld>
             <a:endParaRPr lang="bg-BG"/>
@@ -2212,7 +2468,7 @@
       </p:sp>
       <p:sp>
         <p:nvSpPr>
-          <p:cNvPr id="5" name="Date Placeholder 4"/>
+          <p:cNvPr id="5" name="Date Placeholder 3"/>
           <p:cNvSpPr>
             <a:spLocks noGrp="1"/>
           </p:cNvSpPr>
@@ -2223,12 +2479,21 @@
         <p:spPr/>
         <p:txBody>
           <a:bodyPr/>
-          <a:lstStyle/>
-          <a:p>
-            <a:fld id="{A8A3ED52-B0A0-418D-BE85-E9E3ED0F4A41}" type="datetimeFigureOut">
-              <a:rPr lang="bg-BG" smtClean="0"/>
-              <a:pPr/>
-              <a:t>26.8.2008 г.</a:t>
+          <a:lstStyle>
+            <a:lvl1pPr>
+              <a:defRPr/>
+            </a:lvl1pPr>
+          </a:lstStyle>
+          <a:p>
+            <a:pPr>
+              <a:defRPr/>
+            </a:pPr>
+            <a:fld id="{1784E320-CAA3-416F-A03F-395C329E29A4}" type="datetimeFigureOut">
+              <a:rPr lang="bg-BG"/>
+              <a:pPr>
+                <a:defRPr/>
+              </a:pPr>
+              <a:t>29.11.2008 г.</a:t>
             </a:fld>
             <a:endParaRPr lang="bg-BG"/>
           </a:p>
@@ -2236,7 +2501,7 @@
       </p:sp>
       <p:sp>
         <p:nvSpPr>
-          <p:cNvPr id="6" name="Footer Placeholder 5"/>
+          <p:cNvPr id="6" name="Footer Placeholder 4"/>
           <p:cNvSpPr>
             <a:spLocks noGrp="1"/>
           </p:cNvSpPr>
@@ -2247,15 +2512,22 @@
         <p:spPr/>
         <p:txBody>
           <a:bodyPr/>
-          <a:lstStyle/>
-          <a:p>
-            <a:endParaRPr lang="bg-BG"/>
-          </a:p>
-        </p:txBody>
-      </p:sp>
-      <p:sp>
-        <p:nvSpPr>
-          <p:cNvPr id="7" name="Slide Number Placeholder 6"/>
+          <a:lstStyle>
+            <a:lvl1pPr>
+              <a:defRPr/>
+            </a:lvl1pPr>
+          </a:lstStyle>
+          <a:p>
+            <a:pPr>
+              <a:defRPr/>
+            </a:pPr>
+            <a:endParaRPr lang="bg-BG"/>
+          </a:p>
+        </p:txBody>
+      </p:sp>
+      <p:sp>
+        <p:nvSpPr>
+          <p:cNvPr id="7" name="Slide Number Placeholder 5"/>
           <p:cNvSpPr>
             <a:spLocks noGrp="1"/>
           </p:cNvSpPr>
@@ -2266,11 +2538,20 @@
         <p:spPr/>
         <p:txBody>
           <a:bodyPr/>
-          <a:lstStyle/>
-          <a:p>
-            <a:fld id="{25D8A718-BF1E-4B5B-A668-D4038EA4A2AA}" type="slidenum">
-              <a:rPr lang="bg-BG" smtClean="0"/>
-              <a:pPr/>
+          <a:lstStyle>
+            <a:lvl1pPr>
+              <a:defRPr/>
+            </a:lvl1pPr>
+          </a:lstStyle>
+          <a:p>
+            <a:pPr>
+              <a:defRPr/>
+            </a:pPr>
+            <a:fld id="{F30CAF3F-65EF-462D-9E83-40BE0905CF7B}" type="slidenum">
+              <a:rPr lang="bg-BG"/>
+              <a:pPr>
+                <a:defRPr/>
+              </a:pPr>
               <a:t>‹#›</a:t>
             </a:fld>
             <a:endParaRPr lang="bg-BG"/>
@@ -2351,7 +2632,9 @@
           </a:xfrm>
         </p:spPr>
         <p:txBody>
-          <a:bodyPr/>
+          <a:bodyPr rtlCol="0">
+            <a:normAutofit/>
+          </a:bodyPr>
           <a:lstStyle>
             <a:lvl1pPr marL="0" indent="0">
               <a:buNone/>
@@ -2391,7 +2674,8 @@
             </a:lvl9pPr>
           </a:lstStyle>
           <a:p>
-            <a:endParaRPr lang="bg-BG"/>
+            <a:pPr lvl="0"/>
+            <a:endParaRPr lang="bg-BG" noProof="0"/>
           </a:p>
         </p:txBody>
       </p:sp>
@@ -2462,7 +2746,7 @@
       </p:sp>
       <p:sp>
         <p:nvSpPr>
-          <p:cNvPr id="5" name="Date Placeholder 4"/>
+          <p:cNvPr id="5" name="Date Placeholder 3"/>
           <p:cNvSpPr>
             <a:spLocks noGrp="1"/>
           </p:cNvSpPr>
@@ -2473,12 +2757,21 @@
         <p:spPr/>
         <p:txBody>
           <a:bodyPr/>
-          <a:lstStyle/>
-          <a:p>
-            <a:fld id="{A8A3ED52-B0A0-418D-BE85-E9E3ED0F4A41}" type="datetimeFigureOut">
-              <a:rPr lang="bg-BG" smtClean="0"/>
-              <a:pPr/>
-              <a:t>26.8.2008 г.</a:t>
+          <a:lstStyle>
+            <a:lvl1pPr>
+              <a:defRPr/>
+            </a:lvl1pPr>
+          </a:lstStyle>
+          <a:p>
+            <a:pPr>
+              <a:defRPr/>
+            </a:pPr>
+            <a:fld id="{1FC195A1-12D4-44C1-A6BA-C6E3368AD622}" type="datetimeFigureOut">
+              <a:rPr lang="bg-BG"/>
+              <a:pPr>
+                <a:defRPr/>
+              </a:pPr>
+              <a:t>29.11.2008 г.</a:t>
             </a:fld>
             <a:endParaRPr lang="bg-BG"/>
           </a:p>
@@ -2486,7 +2779,7 @@
       </p:sp>
       <p:sp>
         <p:nvSpPr>
-          <p:cNvPr id="6" name="Footer Placeholder 5"/>
+          <p:cNvPr id="6" name="Footer Placeholder 4"/>
           <p:cNvSpPr>
             <a:spLocks noGrp="1"/>
           </p:cNvSpPr>
@@ -2497,15 +2790,22 @@
         <p:spPr/>
         <p:txBody>
           <a:bodyPr/>
-          <a:lstStyle/>
-          <a:p>
-            <a:endParaRPr lang="bg-BG"/>
-          </a:p>
-        </p:txBody>
-      </p:sp>
-      <p:sp>
-        <p:nvSpPr>
-          <p:cNvPr id="7" name="Slide Number Placeholder 6"/>
+          <a:lstStyle>
+            <a:lvl1pPr>
+              <a:defRPr/>
+            </a:lvl1pPr>
+          </a:lstStyle>
+          <a:p>
+            <a:pPr>
+              <a:defRPr/>
+            </a:pPr>
+            <a:endParaRPr lang="bg-BG"/>
+          </a:p>
+        </p:txBody>
+      </p:sp>
+      <p:sp>
+        <p:nvSpPr>
+          <p:cNvPr id="7" name="Slide Number Placeholder 5"/>
           <p:cNvSpPr>
             <a:spLocks noGrp="1"/>
           </p:cNvSpPr>
@@ -2516,11 +2816,20 @@
         <p:spPr/>
         <p:txBody>
           <a:bodyPr/>
-          <a:lstStyle/>
-          <a:p>
-            <a:fld id="{25D8A718-BF1E-4B5B-A668-D4038EA4A2AA}" type="slidenum">
-              <a:rPr lang="bg-BG" smtClean="0"/>
-              <a:pPr/>
+          <a:lstStyle>
+            <a:lvl1pPr>
+              <a:defRPr/>
+            </a:lvl1pPr>
+          </a:lstStyle>
+          <a:p>
+            <a:pPr>
+              <a:defRPr/>
+            </a:pPr>
+            <a:fld id="{2BCA0B97-AAF2-4DD1-9BA3-0F77C5113AA0}" type="slidenum">
+              <a:rPr lang="bg-BG"/>
+              <a:pPr>
+                <a:defRPr/>
+              </a:pPr>
               <a:t>‹#›</a:t>
             </a:fld>
             <a:endParaRPr lang="bg-BG"/>
@@ -2559,7 +2868,7 @@
       </p:grpSpPr>
       <p:sp>
         <p:nvSpPr>
-          <p:cNvPr id="2" name="Title Placeholder 1"/>
+          <p:cNvPr id="1026" name="Title Placeholder 1"/>
           <p:cNvSpPr>
             <a:spLocks noGrp="1"/>
           </p:cNvSpPr>
@@ -2567,7 +2876,7 @@
             <p:ph type="title"/>
           </p:nvPr>
         </p:nvSpPr>
-        <p:spPr>
+        <p:spPr bwMode="auto">
           <a:xfrm>
             <a:off x="457200" y="274638"/>
             <a:ext cx="8229600" cy="1143000"/>
@@ -2575,24 +2884,34 @@
           <a:prstGeom prst="rect">
             <a:avLst/>
           </a:prstGeom>
+          <a:noFill/>
+          <a:ln w="9525">
+            <a:noFill/>
+            <a:miter lim="800000"/>
+            <a:headEnd/>
+            <a:tailEnd/>
+          </a:ln>
         </p:spPr>
         <p:txBody>
-          <a:bodyPr vert="horz" lIns="91440" tIns="45720" rIns="91440" bIns="45720" rtlCol="0" anchor="ctr">
-            <a:normAutofit/>
+          <a:bodyPr vert="horz" wrap="square" lIns="91440" tIns="45720" rIns="91440" bIns="45720" numCol="1" anchor="ctr" anchorCtr="0" compatLnSpc="1">
+            <a:prstTxWarp prst="textNoShape">
+              <a:avLst/>
+            </a:prstTxWarp>
           </a:bodyPr>
           <a:lstStyle/>
           <a:p>
+            <a:pPr lvl="0"/>
             <a:r>
               <a:rPr lang="en-US" smtClean="0"/>
               <a:t>Click to edit Master title style</a:t>
             </a:r>
-            <a:endParaRPr lang="bg-BG"/>
-          </a:p>
-        </p:txBody>
-      </p:sp>
-      <p:sp>
-        <p:nvSpPr>
-          <p:cNvPr id="3" name="Text Placeholder 2"/>
+            <a:endParaRPr lang="bg-BG" smtClean="0"/>
+          </a:p>
+        </p:txBody>
+      </p:sp>
+      <p:sp>
+        <p:nvSpPr>
+          <p:cNvPr id="1027" name="Text Placeholder 2"/>
           <p:cNvSpPr>
             <a:spLocks noGrp="1"/>
           </p:cNvSpPr>
@@ -2600,7 +2919,7 @@
             <p:ph type="body" idx="1"/>
           </p:nvPr>
         </p:nvSpPr>
-        <p:spPr>
+        <p:spPr bwMode="auto">
           <a:xfrm>
             <a:off x="457200" y="1600200"/>
             <a:ext cx="8229600" cy="4525963"/>
@@ -2608,10 +2927,19 @@
           <a:prstGeom prst="rect">
             <a:avLst/>
           </a:prstGeom>
+          <a:noFill/>
+          <a:ln w="9525">
+            <a:noFill/>
+            <a:miter lim="800000"/>
+            <a:headEnd/>
+            <a:tailEnd/>
+          </a:ln>
         </p:spPr>
         <p:txBody>
-          <a:bodyPr vert="horz" lIns="91440" tIns="45720" rIns="91440" bIns="45720" rtlCol="0">
-            <a:normAutofit/>
+          <a:bodyPr vert="horz" wrap="square" lIns="91440" tIns="45720" rIns="91440" bIns="45720" numCol="1" anchor="t" anchorCtr="0" compatLnSpc="1">
+            <a:prstTxWarp prst="textNoShape">
+              <a:avLst/>
+            </a:prstTxWarp>
           </a:bodyPr>
           <a:lstStyle/>
           <a:p>
@@ -2648,7 +2976,7 @@
               <a:rPr lang="en-US" smtClean="0"/>
               <a:t>Fifth level</a:t>
             </a:r>
-            <a:endParaRPr lang="bg-BG"/>
+            <a:endParaRPr lang="bg-BG" smtClean="0"/>
           </a:p>
         </p:txBody>
       </p:sp>
@@ -2674,21 +3002,33 @@
         <p:txBody>
           <a:bodyPr vert="horz" lIns="91440" tIns="45720" rIns="91440" bIns="45720" rtlCol="0" anchor="ctr"/>
           <a:lstStyle>
-            <a:lvl1pPr algn="l">
-              <a:defRPr sz="1200">
+            <a:lvl1pPr algn="l" fontAlgn="auto">
+              <a:spcBef>
+                <a:spcPts val="0"/>
+              </a:spcBef>
+              <a:spcAft>
+                <a:spcPts val="0"/>
+              </a:spcAft>
+              <a:defRPr sz="1200" smtClean="0">
                 <a:solidFill>
                   <a:schemeClr val="tx1">
                     <a:tint val="75000"/>
                   </a:schemeClr>
                 </a:solidFill>
+                <a:latin typeface="+mn-lt"/>
               </a:defRPr>
             </a:lvl1pPr>
           </a:lstStyle>
           <a:p>
-            <a:fld id="{A8A3ED52-B0A0-418D-BE85-E9E3ED0F4A41}" type="datetimeFigureOut">
-              <a:rPr lang="bg-BG" smtClean="0"/>
-              <a:pPr/>
-              <a:t>26.8.2008 г.</a:t>
+            <a:pPr>
+              <a:defRPr/>
+            </a:pPr>
+            <a:fld id="{0C834172-2323-4E28-9B14-8B924B48608D}" type="datetimeFigureOut">
+              <a:rPr lang="bg-BG"/>
+              <a:pPr>
+                <a:defRPr/>
+              </a:pPr>
+              <a:t>29.11.2008 г.</a:t>
             </a:fld>
             <a:endParaRPr lang="bg-BG"/>
           </a:p>
@@ -2716,17 +3056,27 @@
         <p:txBody>
           <a:bodyPr vert="horz" lIns="91440" tIns="45720" rIns="91440" bIns="45720" rtlCol="0" anchor="ctr"/>
           <a:lstStyle>
-            <a:lvl1pPr algn="ctr">
+            <a:lvl1pPr algn="ctr" fontAlgn="auto">
+              <a:spcBef>
+                <a:spcPts val="0"/>
+              </a:spcBef>
+              <a:spcAft>
+                <a:spcPts val="0"/>
+              </a:spcAft>
               <a:defRPr sz="1200">
                 <a:solidFill>
                   <a:schemeClr val="tx1">
                     <a:tint val="75000"/>
                   </a:schemeClr>
                 </a:solidFill>
+                <a:latin typeface="+mn-lt"/>
               </a:defRPr>
             </a:lvl1pPr>
           </a:lstStyle>
           <a:p>
+            <a:pPr>
+              <a:defRPr/>
+            </a:pPr>
             <a:endParaRPr lang="bg-BG"/>
           </a:p>
         </p:txBody>
@@ -2753,20 +3103,32 @@
         <p:txBody>
           <a:bodyPr vert="horz" lIns="91440" tIns="45720" rIns="91440" bIns="45720" rtlCol="0" anchor="ctr"/>
           <a:lstStyle>
-            <a:lvl1pPr algn="r">
-              <a:defRPr sz="1200">
+            <a:lvl1pPr algn="r" fontAlgn="auto">
+              <a:spcBef>
+                <a:spcPts val="0"/>
+              </a:spcBef>
+              <a:spcAft>
+                <a:spcPts val="0"/>
+              </a:spcAft>
+              <a:defRPr sz="1200" smtClean="0">
                 <a:solidFill>
                   <a:schemeClr val="tx1">
                     <a:tint val="75000"/>
                   </a:schemeClr>
                 </a:solidFill>
+                <a:latin typeface="+mn-lt"/>
               </a:defRPr>
             </a:lvl1pPr>
           </a:lstStyle>
           <a:p>
-            <a:fld id="{25D8A718-BF1E-4B5B-A668-D4038EA4A2AA}" type="slidenum">
-              <a:rPr lang="bg-BG" smtClean="0"/>
-              <a:pPr/>
+            <a:pPr>
+              <a:defRPr/>
+            </a:pPr>
+            <a:fld id="{2F806B0E-3505-40FD-896D-753F055082E7}" type="slidenum">
+              <a:rPr lang="bg-BG"/>
+              <a:pPr>
+                <a:defRPr/>
+              </a:pPr>
               <a:t>‹#›</a:t>
             </a:fld>
             <a:endParaRPr lang="bg-BG"/>
@@ -2777,25 +3139,27 @@
   </p:cSld>
   <p:clrMap bg1="lt1" tx1="dk1" bg2="lt2" tx2="dk2" accent1="accent1" accent2="accent2" accent3="accent3" accent4="accent4" accent5="accent5" accent6="accent6" hlink="hlink" folHlink="folHlink"/>
   <p:sldLayoutIdLst>
-    <p:sldLayoutId id="2147483649" r:id="rId1"/>
-    <p:sldLayoutId id="2147483650" r:id="rId2"/>
-    <p:sldLayoutId id="2147483651" r:id="rId3"/>
-    <p:sldLayoutId id="2147483652" r:id="rId4"/>
-    <p:sldLayoutId id="2147483653" r:id="rId5"/>
+    <p:sldLayoutId id="2147483659" r:id="rId1"/>
+    <p:sldLayoutId id="2147483658" r:id="rId2"/>
+    <p:sldLayoutId id="2147483657" r:id="rId3"/>
+    <p:sldLayoutId id="2147483656" r:id="rId4"/>
+    <p:sldLayoutId id="2147483655" r:id="rId5"/>
     <p:sldLayoutId id="2147483654" r:id="rId6"/>
-    <p:sldLayoutId id="2147483655" r:id="rId7"/>
-    <p:sldLayoutId id="2147483656" r:id="rId8"/>
-    <p:sldLayoutId id="2147483657" r:id="rId9"/>
-    <p:sldLayoutId id="2147483658" r:id="rId10"/>
-    <p:sldLayoutId id="2147483659" r:id="rId11"/>
+    <p:sldLayoutId id="2147483653" r:id="rId7"/>
+    <p:sldLayoutId id="2147483652" r:id="rId8"/>
+    <p:sldLayoutId id="2147483651" r:id="rId9"/>
+    <p:sldLayoutId id="2147483650" r:id="rId10"/>
+    <p:sldLayoutId id="2147483649" r:id="rId11"/>
   </p:sldLayoutIdLst>
   <p:txStyles>
     <p:titleStyle>
-      <a:lvl1pPr algn="ctr" defTabSz="914400" rtl="0" eaLnBrk="1" latinLnBrk="0" hangingPunct="1">
+      <a:lvl1pPr algn="ctr" rtl="0" fontAlgn="base">
         <a:spcBef>
           <a:spcPct val="0"/>
         </a:spcBef>
-        <a:buNone/>
+        <a:spcAft>
+          <a:spcPct val="0"/>
+        </a:spcAft>
         <a:defRPr sz="4400" kern="1200">
           <a:solidFill>
             <a:schemeClr val="tx1"/>
@@ -2805,13 +3169,128 @@
           <a:cs typeface="+mj-cs"/>
         </a:defRPr>
       </a:lvl1pPr>
+      <a:lvl2pPr algn="ctr" rtl="0" fontAlgn="base">
+        <a:spcBef>
+          <a:spcPct val="0"/>
+        </a:spcBef>
+        <a:spcAft>
+          <a:spcPct val="0"/>
+        </a:spcAft>
+        <a:defRPr sz="4400">
+          <a:solidFill>
+            <a:schemeClr val="tx1"/>
+          </a:solidFill>
+          <a:latin typeface="Calibri" pitchFamily="34" charset="0"/>
+        </a:defRPr>
+      </a:lvl2pPr>
+      <a:lvl3pPr algn="ctr" rtl="0" fontAlgn="base">
+        <a:spcBef>
+          <a:spcPct val="0"/>
+        </a:spcBef>
+        <a:spcAft>
+          <a:spcPct val="0"/>
+        </a:spcAft>
+        <a:defRPr sz="4400">
+          <a:solidFill>
+            <a:schemeClr val="tx1"/>
+          </a:solidFill>
+          <a:latin typeface="Calibri" pitchFamily="34" charset="0"/>
+        </a:defRPr>
+      </a:lvl3pPr>
+      <a:lvl4pPr algn="ctr" rtl="0" fontAlgn="base">
+        <a:spcBef>
+          <a:spcPct val="0"/>
+        </a:spcBef>
+        <a:spcAft>
+          <a:spcPct val="0"/>
+        </a:spcAft>
+        <a:defRPr sz="4400">
+          <a:solidFill>
+            <a:schemeClr val="tx1"/>
+          </a:solidFill>
+          <a:latin typeface="Calibri" pitchFamily="34" charset="0"/>
+        </a:defRPr>
+      </a:lvl4pPr>
+      <a:lvl5pPr algn="ctr" rtl="0" fontAlgn="base">
+        <a:spcBef>
+          <a:spcPct val="0"/>
+        </a:spcBef>
+        <a:spcAft>
+          <a:spcPct val="0"/>
+        </a:spcAft>
+        <a:defRPr sz="4400">
+          <a:solidFill>
+            <a:schemeClr val="tx1"/>
+          </a:solidFill>
+          <a:latin typeface="Calibri" pitchFamily="34" charset="0"/>
+        </a:defRPr>
+      </a:lvl5pPr>
+      <a:lvl6pPr marL="457200" algn="ctr" rtl="0" fontAlgn="base">
+        <a:spcBef>
+          <a:spcPct val="0"/>
+        </a:spcBef>
+        <a:spcAft>
+          <a:spcPct val="0"/>
+        </a:spcAft>
+        <a:defRPr sz="4400">
+          <a:solidFill>
+            <a:schemeClr val="tx1"/>
+          </a:solidFill>
+          <a:latin typeface="Calibri" pitchFamily="34" charset="0"/>
+        </a:defRPr>
+      </a:lvl6pPr>
+      <a:lvl7pPr marL="914400" algn="ctr" rtl="0" fontAlgn="base">
+        <a:spcBef>
+          <a:spcPct val="0"/>
+        </a:spcBef>
+        <a:spcAft>
+          <a:spcPct val="0"/>
+        </a:spcAft>
+        <a:defRPr sz="4400">
+          <a:solidFill>
+            <a:schemeClr val="tx1"/>
+          </a:solidFill>
+          <a:latin typeface="Calibri" pitchFamily="34" charset="0"/>
+        </a:defRPr>
+      </a:lvl7pPr>
+      <a:lvl8pPr marL="1371600" algn="ctr" rtl="0" fontAlgn="base">
+        <a:spcBef>
+          <a:spcPct val="0"/>
+        </a:spcBef>
+        <a:spcAft>
+          <a:spcPct val="0"/>
+        </a:spcAft>
+        <a:defRPr sz="4400">
+          <a:solidFill>
+            <a:schemeClr val="tx1"/>
+          </a:solidFill>
+          <a:latin typeface="Calibri" pitchFamily="34" charset="0"/>
+        </a:defRPr>
+      </a:lvl8pPr>
+      <a:lvl9pPr marL="1828800" algn="ctr" rtl="0" fontAlgn="base">
+        <a:spcBef>
+          <a:spcPct val="0"/>
+        </a:spcBef>
+        <a:spcAft>
+          <a:spcPct val="0"/>
+        </a:spcAft>
+        <a:defRPr sz="4400">
+          <a:solidFill>
+            <a:schemeClr val="tx1"/>
+          </a:solidFill>
+          <a:latin typeface="Calibri" pitchFamily="34" charset="0"/>
+        </a:defRPr>
+      </a:lvl9pPr>
     </p:titleStyle>
     <p:bodyStyle>
-      <a:lvl1pPr marL="342900" indent="-342900" algn="l" defTabSz="914400" rtl="0" eaLnBrk="1" latinLnBrk="0" hangingPunct="1">
+      <a:lvl1pPr marL="342900" indent="-342900" algn="l" rtl="0" fontAlgn="base">
         <a:spcBef>
           <a:spcPct val="20000"/>
         </a:spcBef>
-        <a:buFont typeface="Arial" pitchFamily="34" charset="0"/>
+        <a:spcAft>
+          <a:spcPct val="0"/>
+        </a:spcAft>
+        <a:buFont typeface="Arial" charset="0"/>
         <a:buChar char="•"/>
         <a:defRPr sz="3200" kern="1200">
           <a:solidFill>
@@ -2822,11 +3301,14 @@
           <a:cs typeface="+mn-cs"/>
         </a:defRPr>
       </a:lvl1pPr>
-      <a:lvl2pPr marL="742950" indent="-285750" algn="l" defTabSz="914400" rtl="0" eaLnBrk="1" latinLnBrk="0" hangingPunct="1">
+      <a:lvl2pPr marL="742950" indent="-285750" algn="l" rtl="0" fontAlgn="base">
         <a:spcBef>
           <a:spcPct val="20000"/>
         </a:spcBef>
-        <a:buFont typeface="Arial" pitchFamily="34" charset="0"/>
+        <a:spcAft>
+          <a:spcPct val="0"/>
+        </a:spcAft>
+        <a:buFont typeface="Arial" charset="0"/>
         <a:buChar char="–"/>
         <a:defRPr sz="2800" kern="1200">
           <a:solidFill>
@@ -2837,11 +3319,14 @@
           <a:cs typeface="+mn-cs"/>
         </a:defRPr>
       </a:lvl2pPr>
-      <a:lvl3pPr marL="1143000" indent="-228600" algn="l" defTabSz="914400" rtl="0" eaLnBrk="1" latinLnBrk="0" hangingPunct="1">
+      <a:lvl3pPr marL="1143000" indent="-228600" algn="l" rtl="0" fontAlgn="base">
         <a:spcBef>
           <a:spcPct val="20000"/>
         </a:spcBef>
-        <a:buFont typeface="Arial" pitchFamily="34" charset="0"/>
+        <a:spcAft>
+          <a:spcPct val="0"/>
+        </a:spcAft>
+        <a:buFont typeface="Arial" charset="0"/>
         <a:buChar char="•"/>
         <a:defRPr sz="2400" kern="1200">
           <a:solidFill>
@@ -2852,11 +3337,14 @@
           <a:cs typeface="+mn-cs"/>
         </a:defRPr>
       </a:lvl3pPr>
-      <a:lvl4pPr marL="1600200" indent="-228600" algn="l" defTabSz="914400" rtl="0" eaLnBrk="1" latinLnBrk="0" hangingPunct="1">
+      <a:lvl4pPr marL="1600200" indent="-228600" algn="l" rtl="0" fontAlgn="base">
         <a:spcBef>
           <a:spcPct val="20000"/>
         </a:spcBef>
-        <a:buFont typeface="Arial" pitchFamily="34" charset="0"/>
+        <a:spcAft>
+          <a:spcPct val="0"/>
+        </a:spcAft>
+        <a:buFont typeface="Arial" charset="0"/>
         <a:buChar char="–"/>
         <a:defRPr sz="2000" kern="1200">
           <a:solidFill>
@@ -2867,11 +3355,14 @@
           <a:cs typeface="+mn-cs"/>
         </a:defRPr>
       </a:lvl4pPr>
-      <a:lvl5pPr marL="2057400" indent="-228600" algn="l" defTabSz="914400" rtl="0" eaLnBrk="1" latinLnBrk="0" hangingPunct="1">
+      <a:lvl5pPr marL="2057400" indent="-228600" algn="l" rtl="0" fontAlgn="base">
         <a:spcBef>
           <a:spcPct val="20000"/>
         </a:spcBef>
-        <a:buFont typeface="Arial" pitchFamily="34" charset="0"/>
+        <a:spcAft>
+          <a:spcPct val="0"/>
+        </a:spcAft>
+        <a:buFont typeface="Arial" charset="0"/>
         <a:buChar char="»"/>
         <a:defRPr sz="2000" kern="1200">
           <a:solidFill>
@@ -3061,144 +3552,509 @@
       </p:grpSpPr>
       <p:sp>
         <p:nvSpPr>
-          <p:cNvPr id="7" name="Rectangle 6"/>
-          <p:cNvSpPr/>
+          <p:cNvPr id="12" name="Rounded Rectangle 11"/>
+          <p:cNvSpPr>
+            <a:spLocks noChangeArrowheads="1"/>
+          </p:cNvSpPr>
           <p:nvPr/>
         </p:nvSpPr>
-        <p:spPr>
+        <p:spPr bwMode="auto">
           <a:xfrm>
-            <a:off x="2500298" y="214290"/>
-            <a:ext cx="2786082" cy="1928826"/>
+            <a:off x="395288" y="3141663"/>
+            <a:ext cx="1622425" cy="571500"/>
+          </a:xfrm>
+          <a:prstGeom prst="roundRect">
+            <a:avLst>
+              <a:gd name="adj" fmla="val 16667"/>
+            </a:avLst>
+          </a:prstGeom>
+          <a:solidFill>
+            <a:srgbClr val="EAEAEA"/>
+          </a:solidFill>
+          <a:ln w="25400" algn="ctr">
+            <a:solidFill>
+              <a:schemeClr val="tx1"/>
+            </a:solidFill>
+            <a:round/>
+            <a:headEnd/>
+            <a:tailEnd/>
+          </a:ln>
+        </p:spPr>
+        <p:txBody>
+          <a:bodyPr anchor="ctr"/>
+          <a:lstStyle/>
+          <a:p>
+            <a:pPr algn="ctr"/>
+            <a:r>
+              <a:rPr lang="bg-BG" b="1">
+                <a:effectLst>
+                  <a:outerShdw blurRad="38100" dist="38100" dir="2700000" algn="tl">
+                    <a:srgbClr val="FFFFFF"/>
+                  </a:outerShdw>
+                </a:effectLst>
+                <a:latin typeface="Calibri" pitchFamily="34" charset="0"/>
+              </a:rPr>
+              <a:t>Клавиатурата</a:t>
+            </a:r>
+          </a:p>
+        </p:txBody>
+      </p:sp>
+      <p:cxnSp>
+        <p:nvCxnSpPr>
+          <p:cNvPr id="23" name="Straight Arrow Connector 22"/>
+          <p:cNvCxnSpPr>
+            <a:cxnSpLocks noChangeShapeType="1"/>
+            <a:endCxn id="33" idx="1"/>
+          </p:cNvCxnSpPr>
+          <p:nvPr/>
+        </p:nvCxnSpPr>
+        <p:spPr bwMode="auto">
+          <a:xfrm>
+            <a:off x="2022475" y="3427413"/>
+            <a:ext cx="860425" cy="465137"/>
+          </a:xfrm>
+          <a:prstGeom prst="straightConnector1">
+            <a:avLst/>
+          </a:prstGeom>
+          <a:noFill/>
+          <a:ln w="28575" algn="ctr">
+            <a:solidFill>
+              <a:schemeClr val="tx1"/>
+            </a:solidFill>
+            <a:round/>
+            <a:headEnd/>
+            <a:tailEnd type="arrow" w="med" len="med"/>
+          </a:ln>
+        </p:spPr>
+      </p:cxnSp>
+      <p:cxnSp>
+        <p:nvCxnSpPr>
+          <p:cNvPr id="26" name="Straight Arrow Connector 25"/>
+          <p:cNvCxnSpPr>
+            <a:cxnSpLocks noChangeShapeType="1"/>
+          </p:cNvCxnSpPr>
+          <p:nvPr/>
+        </p:nvCxnSpPr>
+        <p:spPr bwMode="auto">
+          <a:xfrm flipV="1">
+            <a:off x="1685925" y="4102100"/>
+            <a:ext cx="1203325" cy="468313"/>
+          </a:xfrm>
+          <a:prstGeom prst="straightConnector1">
+            <a:avLst/>
+          </a:prstGeom>
+          <a:noFill/>
+          <a:ln w="28575" algn="ctr">
+            <a:solidFill>
+              <a:schemeClr val="tx1"/>
+            </a:solidFill>
+            <a:round/>
+            <a:headEnd/>
+            <a:tailEnd type="arrow" w="med" len="med"/>
+          </a:ln>
+        </p:spPr>
+      </p:cxnSp>
+      <p:sp>
+        <p:nvSpPr>
+          <p:cNvPr id="32" name="Flowchart: Magnetic Disk 31"/>
+          <p:cNvSpPr>
+            <a:spLocks noChangeArrowheads="1"/>
+          </p:cNvSpPr>
+          <p:nvPr/>
+        </p:nvSpPr>
+        <p:spPr bwMode="auto">
+          <a:xfrm>
+            <a:off x="609600" y="4213225"/>
+            <a:ext cx="1071563" cy="714375"/>
+          </a:xfrm>
+          <a:prstGeom prst="flowChartMagneticDisk">
+            <a:avLst/>
+          </a:prstGeom>
+          <a:solidFill>
+            <a:srgbClr val="EAEAEA"/>
+          </a:solidFill>
+          <a:ln w="25400" algn="ctr">
+            <a:solidFill>
+              <a:schemeClr val="tx1"/>
+            </a:solidFill>
+            <a:round/>
+            <a:headEnd/>
+            <a:tailEnd/>
+          </a:ln>
+        </p:spPr>
+        <p:txBody>
+          <a:bodyPr anchor="ctr"/>
+          <a:lstStyle/>
+          <a:p>
+            <a:pPr algn="ctr">
+              <a:lnSpc>
+                <a:spcPct val="140000"/>
+              </a:lnSpc>
+            </a:pPr>
+            <a:r>
+              <a:rPr lang="bg-BG" b="1">
+                <a:effectLst>
+                  <a:outerShdw blurRad="38100" dist="38100" dir="2700000" algn="tl">
+                    <a:srgbClr val="FFFFFF"/>
+                  </a:outerShdw>
+                </a:effectLst>
+                <a:latin typeface="Calibri" pitchFamily="34" charset="0"/>
+              </a:rPr>
+              <a:t>Файл</a:t>
+            </a:r>
+          </a:p>
+        </p:txBody>
+      </p:sp>
+      <p:sp>
+        <p:nvSpPr>
+          <p:cNvPr id="33" name="Flowchart: Multidocument 32"/>
+          <p:cNvSpPr>
+            <a:spLocks noChangeArrowheads="1"/>
+          </p:cNvSpPr>
+          <p:nvPr/>
+        </p:nvSpPr>
+        <p:spPr bwMode="auto">
+          <a:xfrm>
+            <a:off x="2895600" y="3284538"/>
+            <a:ext cx="2143125" cy="1214437"/>
+          </a:xfrm>
+          <a:prstGeom prst="flowChartMultidocument">
+            <a:avLst/>
+          </a:prstGeom>
+          <a:solidFill>
+            <a:srgbClr val="EAEAEA"/>
+          </a:solidFill>
+          <a:ln w="25400" algn="ctr">
+            <a:solidFill>
+              <a:schemeClr val="tx1"/>
+            </a:solidFill>
+            <a:miter lim="800000"/>
+            <a:headEnd/>
+            <a:tailEnd/>
+          </a:ln>
+        </p:spPr>
+        <p:txBody>
+          <a:bodyPr anchor="ctr"/>
+          <a:lstStyle/>
+          <a:p>
+            <a:pPr algn="ctr"/>
+            <a:r>
+              <a:rPr lang="bg-BG" b="1">
+                <a:effectLst>
+                  <a:outerShdw blurRad="38100" dist="38100" dir="2700000" algn="tl">
+                    <a:srgbClr val="FFFFFF"/>
+                  </a:outerShdw>
+                </a:effectLst>
+                <a:latin typeface="Calibri" pitchFamily="34" charset="0"/>
+              </a:rPr>
+              <a:t>Програма</a:t>
+            </a:r>
+            <a:endParaRPr lang="en-US" b="1">
+              <a:effectLst>
+                <a:outerShdw blurRad="38100" dist="38100" dir="2700000" algn="tl">
+                  <a:srgbClr val="FFFFFF"/>
+                </a:outerShdw>
+              </a:effectLst>
+              <a:latin typeface="Calibri" pitchFamily="34" charset="0"/>
+            </a:endParaRPr>
+          </a:p>
+        </p:txBody>
+      </p:sp>
+      <p:cxnSp>
+        <p:nvCxnSpPr>
+          <p:cNvPr id="36" name="Straight Arrow Connector 35"/>
+          <p:cNvCxnSpPr>
+            <a:cxnSpLocks noChangeShapeType="1"/>
+          </p:cNvCxnSpPr>
+          <p:nvPr/>
+        </p:nvCxnSpPr>
+        <p:spPr bwMode="auto">
+          <a:xfrm flipV="1">
+            <a:off x="5048250" y="3751263"/>
+            <a:ext cx="928688" cy="0"/>
+          </a:xfrm>
+          <a:prstGeom prst="straightConnector1">
+            <a:avLst/>
+          </a:prstGeom>
+          <a:noFill/>
+          <a:ln w="28575" algn="ctr">
+            <a:solidFill>
+              <a:schemeClr val="tx1"/>
+            </a:solidFill>
+            <a:round/>
+            <a:headEnd/>
+            <a:tailEnd type="arrow" w="med" len="med"/>
+          </a:ln>
+        </p:spPr>
+      </p:cxnSp>
+      <p:sp>
+        <p:nvSpPr>
+          <p:cNvPr id="13331" name="Text Box 19"/>
+          <p:cNvSpPr txBox="1">
+            <a:spLocks noChangeArrowheads="1"/>
+          </p:cNvSpPr>
+          <p:nvPr/>
+        </p:nvSpPr>
+        <p:spPr bwMode="auto">
+          <a:xfrm>
+            <a:off x="5978525" y="3387725"/>
+            <a:ext cx="1728788" cy="719138"/>
           </a:xfrm>
           <a:prstGeom prst="rect">
             <a:avLst/>
           </a:prstGeom>
           <a:solidFill>
-            <a:schemeClr val="accent1">
-              <a:lumMod val="40000"/>
-              <a:lumOff val="60000"/>
-            </a:schemeClr>
+            <a:srgbClr val="EAEAEA"/>
           </a:solidFill>
+          <a:ln w="25400" algn="ctr">
+            <a:solidFill>
+              <a:schemeClr val="tx1"/>
+            </a:solidFill>
+            <a:miter lim="800000"/>
+            <a:headEnd/>
+            <a:tailEnd/>
+          </a:ln>
+          <a:effectLst/>
         </p:spPr>
-        <p:style>
-          <a:lnRef idx="2">
-            <a:schemeClr val="accent1">
-              <a:shade val="50000"/>
-            </a:schemeClr>
-          </a:lnRef>
-          <a:fillRef idx="1">
-            <a:schemeClr val="accent1"/>
-          </a:fillRef>
-          <a:effectRef idx="0">
-            <a:schemeClr val="accent1"/>
-          </a:effectRef>
-          <a:fontRef idx="minor">
-            <a:schemeClr val="lt1"/>
-          </a:fontRef>
-        </p:style>
-        <p:txBody>
-          <a:bodyPr rtlCol="0" anchor="ctr"/>
+        <p:txBody>
+          <a:bodyPr anchor="ctr"/>
           <a:lstStyle/>
           <a:p>
             <a:pPr algn="ctr"/>
             <a:r>
-              <a:rPr lang="en-US" dirty="0" smtClean="0">
-                <a:solidFill>
-                  <a:schemeClr val="tx1"/>
-                </a:solidFill>
+              <a:rPr lang="bg-BG" b="1">
+                <a:effectLst>
+                  <a:outerShdw blurRad="38100" dist="38100" dir="2700000" algn="tl">
+                    <a:srgbClr val="FFFFFF"/>
+                  </a:outerShdw>
+                </a:effectLst>
+              </a:rPr>
+              <a:t>Отпечатване на </a:t>
+            </a:r>
+            <a:r>
+              <a:rPr lang="en-US" b="1">
+                <a:effectLst>
+                  <a:outerShdw blurRad="38100" dist="38100" dir="2700000" algn="tl">
+                    <a:srgbClr val="FFFFFF"/>
+                  </a:outerShdw>
+                </a:effectLst>
+              </a:rPr>
+              <a:t>e</a:t>
+            </a:r>
+            <a:r>
+              <a:rPr lang="bg-BG" b="1">
+                <a:effectLst>
+                  <a:outerShdw blurRad="38100" dist="38100" dir="2700000" algn="tl">
+                    <a:srgbClr val="FFFFFF"/>
+                  </a:outerShdw>
+                </a:effectLst>
+              </a:rPr>
+              <a:t>кран</a:t>
+            </a:r>
+            <a:r>
+              <a:rPr lang="en-US" b="1">
+                <a:effectLst>
+                  <a:outerShdw blurRad="38100" dist="38100" dir="2700000" algn="tl">
+                    <a:srgbClr val="FFFFFF"/>
+                  </a:outerShdw>
+                </a:effectLst>
+              </a:rPr>
+              <a:t>a</a:t>
+            </a:r>
+            <a:endParaRPr lang="bg-BG" b="1">
+              <a:effectLst>
+                <a:outerShdw blurRad="38100" dist="38100" dir="2700000" algn="tl">
+                  <a:srgbClr val="FFFFFF"/>
+                </a:outerShdw>
+              </a:effectLst>
+            </a:endParaRPr>
+          </a:p>
+        </p:txBody>
+      </p:sp>
+    </p:spTree>
+  </p:cSld>
+  <p:clrMapOvr>
+    <a:masterClrMapping/>
+  </p:clrMapOvr>
+</p:sld>
+</file>
+
+<file path=ppt/slides/slide2.xml><?xml version="1.0" encoding="utf-8"?>
+<p:sld xmlns:a="http://schemas.openxmlformats.org/drawingml/2006/main" xmlns:r="http://schemas.openxmlformats.org/officeDocument/2006/relationships" xmlns:p="http://schemas.openxmlformats.org/presentationml/2006/main">
+  <p:cSld>
+    <p:spTree>
+      <p:nvGrpSpPr>
+        <p:cNvPr id="1" name=""/>
+        <p:cNvGrpSpPr/>
+        <p:nvPr/>
+      </p:nvGrpSpPr>
+      <p:grpSpPr>
+        <a:xfrm>
+          <a:off x="0" y="0"/>
+          <a:ext cx="0" cy="0"/>
+          <a:chOff x="0" y="0"/>
+          <a:chExt cx="0" cy="0"/>
+        </a:xfrm>
+      </p:grpSpPr>
+      <p:sp>
+        <p:nvSpPr>
+          <p:cNvPr id="7" name="Rectangle 6"/>
+          <p:cNvSpPr>
+            <a:spLocks noChangeArrowheads="1"/>
+          </p:cNvSpPr>
+          <p:nvPr/>
+        </p:nvSpPr>
+        <p:spPr bwMode="auto">
+          <a:xfrm>
+            <a:off x="3132138" y="2133600"/>
+            <a:ext cx="2786062" cy="1928813"/>
+          </a:xfrm>
+          <a:prstGeom prst="rect">
+            <a:avLst/>
+          </a:prstGeom>
+          <a:solidFill>
+            <a:srgbClr val="EAEAEA"/>
+          </a:solidFill>
+          <a:ln w="25400" algn="ctr">
+            <a:solidFill>
+              <a:schemeClr val="tx1"/>
+            </a:solidFill>
+            <a:miter lim="800000"/>
+            <a:headEnd/>
+            <a:tailEnd/>
+          </a:ln>
+        </p:spPr>
+        <p:txBody>
+          <a:bodyPr anchor="ctr"/>
+          <a:lstStyle/>
+          <a:p>
+            <a:pPr algn="ctr"/>
+            <a:r>
+              <a:rPr lang="en-US" b="1">
+                <a:effectLst>
+                  <a:outerShdw blurRad="38100" dist="38100" dir="2700000" algn="tl">
+                    <a:srgbClr val="FFFFFF"/>
+                  </a:outerShdw>
+                </a:effectLst>
+                <a:latin typeface="Calibri" pitchFamily="34" charset="0"/>
               </a:rPr>
               <a:t>Java </a:t>
             </a:r>
             <a:r>
-              <a:rPr lang="bg-BG" dirty="0" smtClean="0">
-                <a:solidFill>
-                  <a:schemeClr val="tx1"/>
-                </a:solidFill>
+              <a:rPr lang="bg-BG" b="1">
+                <a:effectLst>
+                  <a:outerShdw blurRad="38100" dist="38100" dir="2700000" algn="tl">
+                    <a:srgbClr val="FFFFFF"/>
+                  </a:outerShdw>
+                </a:effectLst>
+                <a:latin typeface="Calibri" pitchFamily="34" charset="0"/>
               </a:rPr>
-              <a:t>клас изпълняващ се в </a:t>
-            </a:r>
-            <a:r>
-              <a:rPr lang="en-US" dirty="0" smtClean="0">
-                <a:solidFill>
-                  <a:schemeClr val="tx1"/>
-                </a:solidFill>
+              <a:t>клас</a:t>
+            </a:r>
+            <a:r>
+              <a:rPr lang="en-US" b="1">
+                <a:effectLst>
+                  <a:outerShdw blurRad="38100" dist="38100" dir="2700000" algn="tl">
+                    <a:srgbClr val="FFFFFF"/>
+                  </a:outerShdw>
+                </a:effectLst>
+                <a:latin typeface="Calibri" pitchFamily="34" charset="0"/>
+              </a:rPr>
+              <a:t>,</a:t>
+            </a:r>
+            <a:r>
+              <a:rPr lang="bg-BG" b="1">
+                <a:effectLst>
+                  <a:outerShdw blurRad="38100" dist="38100" dir="2700000" algn="tl">
+                    <a:srgbClr val="FFFFFF"/>
+                  </a:outerShdw>
+                </a:effectLst>
+                <a:latin typeface="Calibri" pitchFamily="34" charset="0"/>
+              </a:rPr>
+              <a:t> изпълняващ се в </a:t>
+            </a:r>
+            <a:r>
+              <a:rPr lang="en-US" b="1">
+                <a:effectLst>
+                  <a:outerShdw blurRad="38100" dist="38100" dir="2700000" algn="tl">
+                    <a:srgbClr val="FFFFFF"/>
+                  </a:outerShdw>
+                </a:effectLst>
+                <a:latin typeface="Calibri" pitchFamily="34" charset="0"/>
               </a:rPr>
               <a:t>JVM</a:t>
             </a:r>
           </a:p>
           <a:p>
             <a:pPr algn="ctr"/>
-            <a:endParaRPr lang="en-US" dirty="0" smtClean="0">
-              <a:solidFill>
-                <a:schemeClr val="tx1"/>
-              </a:solidFill>
+            <a:endParaRPr lang="en-US" b="1">
+              <a:effectLst>
+                <a:outerShdw blurRad="38100" dist="38100" dir="2700000" algn="tl">
+                  <a:srgbClr val="FFFFFF"/>
+                </a:outerShdw>
+              </a:effectLst>
+              <a:latin typeface="Calibri" pitchFamily="34" charset="0"/>
             </a:endParaRPr>
           </a:p>
           <a:p>
             <a:pPr algn="ctr"/>
             <a:r>
-              <a:rPr lang="bg-BG" dirty="0" smtClean="0">
-                <a:solidFill>
-                  <a:schemeClr val="tx1"/>
-                </a:solidFill>
+              <a:rPr lang="bg-BG" b="1">
+                <a:effectLst>
+                  <a:outerShdw blurRad="38100" dist="38100" dir="2700000" algn="tl">
+                    <a:srgbClr val="FFFFFF"/>
+                  </a:outerShdw>
+                </a:effectLst>
+                <a:latin typeface="Calibri" pitchFamily="34" charset="0"/>
               </a:rPr>
               <a:t>Класът използва </a:t>
             </a:r>
             <a:r>
-              <a:rPr lang="en-US" dirty="0" err="1" smtClean="0">
-                <a:solidFill>
-                  <a:schemeClr val="tx1"/>
-                </a:solidFill>
+              <a:rPr lang="en-US" b="1">
+                <a:effectLst>
+                  <a:outerShdw blurRad="38100" dist="38100" dir="2700000" algn="tl">
+                    <a:srgbClr val="FFFFFF"/>
+                  </a:outerShdw>
+                </a:effectLst>
+                <a:latin typeface="Calibri" pitchFamily="34" charset="0"/>
               </a:rPr>
-              <a:t>System.in.read</a:t>
-            </a:r>
-            <a:r>
-              <a:rPr lang="en-US" dirty="0" smtClean="0">
-                <a:solidFill>
-                  <a:schemeClr val="tx1"/>
-                </a:solidFill>
-              </a:rPr>
-              <a:t>()</a:t>
+              <a:t>System.in.read()</a:t>
             </a:r>
           </a:p>
           <a:p>
             <a:pPr algn="ctr"/>
             <a:r>
-              <a:rPr lang="bg-BG" dirty="0">
-                <a:solidFill>
-                  <a:schemeClr val="tx1"/>
-                </a:solidFill>
+              <a:rPr lang="bg-BG" b="1">
+                <a:effectLst>
+                  <a:outerShdw blurRad="38100" dist="38100" dir="2700000" algn="tl">
+                    <a:srgbClr val="FFFFFF"/>
+                  </a:outerShdw>
+                </a:effectLst>
+                <a:latin typeface="Calibri" pitchFamily="34" charset="0"/>
               </a:rPr>
               <a:t>и</a:t>
             </a:r>
-            <a:endParaRPr lang="bg-BG" dirty="0" smtClean="0">
-              <a:solidFill>
-                <a:schemeClr val="tx1"/>
-              </a:solidFill>
-            </a:endParaRPr>
           </a:p>
           <a:p>
             <a:pPr algn="ctr"/>
             <a:r>
-              <a:rPr lang="en-US" dirty="0" err="1" smtClean="0">
-                <a:solidFill>
-                  <a:schemeClr val="tx1"/>
-                </a:solidFill>
+              <a:rPr lang="en-US" b="1">
+                <a:effectLst>
+                  <a:outerShdw blurRad="38100" dist="38100" dir="2700000" algn="tl">
+                    <a:srgbClr val="FFFFFF"/>
+                  </a:outerShdw>
+                </a:effectLst>
+                <a:latin typeface="Calibri" pitchFamily="34" charset="0"/>
               </a:rPr>
-              <a:t>System.out.println</a:t>
-            </a:r>
-            <a:r>
-              <a:rPr lang="en-US" dirty="0" smtClean="0">
-                <a:solidFill>
-                  <a:schemeClr val="tx1"/>
-                </a:solidFill>
-              </a:rPr>
-              <a:t>()</a:t>
-            </a:r>
-            <a:endParaRPr lang="bg-BG" dirty="0">
-              <a:solidFill>
-                <a:schemeClr val="tx1"/>
-              </a:solidFill>
+              <a:t>System.out.println()</a:t>
+            </a:r>
+            <a:endParaRPr lang="bg-BG" b="1">
+              <a:effectLst>
+                <a:outerShdw blurRad="38100" dist="38100" dir="2700000" algn="tl">
+                  <a:srgbClr val="FFFFFF"/>
+                </a:outerShdw>
+              </a:effectLst>
+              <a:latin typeface="Calibri" pitchFamily="34" charset="0"/>
             </a:endParaRPr>
           </a:p>
         </p:txBody>
@@ -3207,739 +4063,356 @@
         <p:nvCxnSpPr>
           <p:cNvPr id="11" name="Straight Arrow Connector 10"/>
           <p:cNvCxnSpPr>
+            <a:cxnSpLocks noChangeShapeType="1"/>
             <a:stCxn id="5" idx="3"/>
           </p:cNvCxnSpPr>
           <p:nvPr/>
         </p:nvCxnSpPr>
-        <p:spPr>
+        <p:spPr bwMode="auto">
           <a:xfrm>
-            <a:off x="2000232" y="1214422"/>
-            <a:ext cx="1000132" cy="214314"/>
+            <a:off x="2695575" y="3133725"/>
+            <a:ext cx="1000125" cy="214313"/>
           </a:xfrm>
           <a:prstGeom prst="straightConnector1">
             <a:avLst/>
           </a:prstGeom>
-          <a:ln w="28575">
-            <a:tailEnd type="arrow"/>
+          <a:noFill/>
+          <a:ln w="28575" algn="ctr">
+            <a:solidFill>
+              <a:schemeClr val="tx1"/>
+            </a:solidFill>
+            <a:round/>
+            <a:headEnd/>
+            <a:tailEnd type="arrow" w="med" len="med"/>
           </a:ln>
         </p:spPr>
-        <p:style>
-          <a:lnRef idx="1">
-            <a:schemeClr val="accent1"/>
-          </a:lnRef>
-          <a:fillRef idx="0">
-            <a:schemeClr val="accent1"/>
-          </a:fillRef>
-          <a:effectRef idx="0">
-            <a:schemeClr val="accent1"/>
-          </a:effectRef>
-          <a:fontRef idx="minor">
-            <a:schemeClr val="tx1"/>
-          </a:fontRef>
-        </p:style>
       </p:cxnSp>
       <p:sp>
         <p:nvSpPr>
           <p:cNvPr id="5" name="Rounded Rectangle 4"/>
-          <p:cNvSpPr/>
+          <p:cNvSpPr>
+            <a:spLocks noChangeArrowheads="1"/>
+          </p:cNvSpPr>
           <p:nvPr/>
         </p:nvSpPr>
-        <p:spPr>
+        <p:spPr bwMode="auto">
           <a:xfrm>
-            <a:off x="428596" y="928670"/>
-            <a:ext cx="1571636" cy="571504"/>
+            <a:off x="1060450" y="2847975"/>
+            <a:ext cx="1622425" cy="571500"/>
           </a:xfrm>
           <a:prstGeom prst="roundRect">
-            <a:avLst/>
+            <a:avLst>
+              <a:gd name="adj" fmla="val 16667"/>
+            </a:avLst>
           </a:prstGeom>
           <a:solidFill>
-            <a:schemeClr val="accent1">
-              <a:lumMod val="40000"/>
-              <a:lumOff val="60000"/>
-            </a:schemeClr>
+            <a:srgbClr val="EAEAEA"/>
           </a:solidFill>
-          <a:ln>
+          <a:ln w="25400" algn="ctr">
             <a:solidFill>
-              <a:schemeClr val="tx2">
-                <a:lumMod val="40000"/>
-                <a:lumOff val="60000"/>
-              </a:schemeClr>
+              <a:schemeClr val="tx1"/>
             </a:solidFill>
+            <a:round/>
+            <a:headEnd/>
+            <a:tailEnd/>
           </a:ln>
         </p:spPr>
-        <p:style>
-          <a:lnRef idx="2">
-            <a:schemeClr val="accent1">
-              <a:shade val="50000"/>
-            </a:schemeClr>
-          </a:lnRef>
-          <a:fillRef idx="1">
-            <a:schemeClr val="accent1"/>
-          </a:fillRef>
-          <a:effectRef idx="0">
-            <a:schemeClr val="accent1"/>
-          </a:effectRef>
-          <a:fontRef idx="minor">
-            <a:schemeClr val="lt1"/>
-          </a:fontRef>
-        </p:style>
-        <p:txBody>
-          <a:bodyPr rtlCol="0" anchor="ctr"/>
+        <p:txBody>
+          <a:bodyPr anchor="ctr"/>
           <a:lstStyle/>
           <a:p>
             <a:pPr algn="ctr"/>
             <a:r>
-              <a:rPr lang="bg-BG" dirty="0" smtClean="0">
-                <a:solidFill>
-                  <a:schemeClr val="tx1"/>
-                </a:solidFill>
+              <a:rPr lang="bg-BG" b="1">
+                <a:effectLst>
+                  <a:outerShdw blurRad="38100" dist="38100" dir="2700000" algn="tl">
+                    <a:srgbClr val="FFFFFF"/>
+                  </a:outerShdw>
+                </a:effectLst>
+                <a:latin typeface="Calibri" pitchFamily="34" charset="0"/>
               </a:rPr>
               <a:t>Вход от клавиатурата</a:t>
             </a:r>
-            <a:endParaRPr lang="bg-BG" dirty="0">
-              <a:solidFill>
-                <a:schemeClr val="tx1"/>
-              </a:solidFill>
-            </a:endParaRPr>
-          </a:p>
-        </p:txBody>
-      </p:sp>
-      <p:sp>
-        <p:nvSpPr>
-          <p:cNvPr id="17" name="TextBox 16"/>
-          <p:cNvSpPr txBox="1"/>
+          </a:p>
+        </p:txBody>
+      </p:sp>
+      <p:sp>
+        <p:nvSpPr>
+          <p:cNvPr id="14343" name="TextBox 16"/>
+          <p:cNvSpPr txBox="1">
+            <a:spLocks noChangeArrowheads="1"/>
+          </p:cNvSpPr>
           <p:nvPr/>
         </p:nvSpPr>
-        <p:spPr>
+        <p:spPr bwMode="auto">
           <a:xfrm>
-            <a:off x="807292" y="571480"/>
-            <a:ext cx="764312" cy="369332"/>
+            <a:off x="1473200" y="2492375"/>
+            <a:ext cx="760413" cy="366713"/>
           </a:xfrm>
           <a:prstGeom prst="rect">
             <a:avLst/>
           </a:prstGeom>
           <a:noFill/>
+          <a:ln w="9525">
+            <a:noFill/>
+            <a:miter lim="800000"/>
+            <a:headEnd/>
+            <a:tailEnd/>
+          </a:ln>
         </p:spPr>
         <p:txBody>
-          <a:bodyPr wrap="none" rtlCol="0">
+          <a:bodyPr wrap="none">
             <a:spAutoFit/>
           </a:bodyPr>
           <a:lstStyle/>
           <a:p>
             <a:r>
-              <a:rPr lang="en-US" b="1" dirty="0" smtClean="0"/>
+              <a:rPr lang="en-US" b="1">
+                <a:latin typeface="Calibri" pitchFamily="34" charset="0"/>
+              </a:rPr>
               <a:t>STDIN</a:t>
             </a:r>
-            <a:endParaRPr lang="bg-BG" b="1" dirty="0"/>
+            <a:endParaRPr lang="bg-BG" b="1">
+              <a:latin typeface="Calibri" pitchFamily="34" charset="0"/>
+            </a:endParaRPr>
           </a:p>
         </p:txBody>
       </p:sp>
       <p:sp>
         <p:nvSpPr>
           <p:cNvPr id="16" name="Rounded Rectangle 15"/>
-          <p:cNvSpPr/>
+          <p:cNvSpPr>
+            <a:spLocks noChangeArrowheads="1"/>
+          </p:cNvSpPr>
           <p:nvPr/>
         </p:nvSpPr>
-        <p:spPr>
+        <p:spPr bwMode="auto">
           <a:xfrm>
-            <a:off x="5715008" y="1428736"/>
-            <a:ext cx="1571636" cy="571504"/>
+            <a:off x="6346825" y="3348038"/>
+            <a:ext cx="1571625" cy="571500"/>
           </a:xfrm>
           <a:prstGeom prst="roundRect">
-            <a:avLst/>
+            <a:avLst>
+              <a:gd name="adj" fmla="val 16667"/>
+            </a:avLst>
           </a:prstGeom>
           <a:solidFill>
-            <a:schemeClr val="accent1">
-              <a:lumMod val="40000"/>
-              <a:lumOff val="60000"/>
-            </a:schemeClr>
+            <a:srgbClr val="EAEAEA"/>
           </a:solidFill>
-          <a:ln>
+          <a:ln w="25400" algn="ctr">
             <a:solidFill>
-              <a:schemeClr val="tx2">
-                <a:lumMod val="40000"/>
-                <a:lumOff val="60000"/>
-              </a:schemeClr>
+              <a:schemeClr val="tx1"/>
             </a:solidFill>
+            <a:round/>
+            <a:headEnd/>
+            <a:tailEnd/>
           </a:ln>
         </p:spPr>
-        <p:style>
-          <a:lnRef idx="2">
-            <a:schemeClr val="accent1">
-              <a:shade val="50000"/>
-            </a:schemeClr>
-          </a:lnRef>
-          <a:fillRef idx="1">
-            <a:schemeClr val="accent1"/>
-          </a:fillRef>
-          <a:effectRef idx="0">
-            <a:schemeClr val="accent1"/>
-          </a:effectRef>
-          <a:fontRef idx="minor">
-            <a:schemeClr val="lt1"/>
-          </a:fontRef>
-        </p:style>
-        <p:txBody>
-          <a:bodyPr rtlCol="0" anchor="ctr"/>
+        <p:txBody>
+          <a:bodyPr anchor="ctr"/>
           <a:lstStyle/>
           <a:p>
             <a:pPr algn="ctr"/>
             <a:r>
-              <a:rPr lang="bg-BG" dirty="0" smtClean="0">
-                <a:solidFill>
-                  <a:schemeClr val="tx1"/>
-                </a:solidFill>
+              <a:rPr lang="bg-BG" b="1">
+                <a:effectLst>
+                  <a:outerShdw blurRad="38100" dist="38100" dir="2700000" algn="tl">
+                    <a:srgbClr val="FFFFFF"/>
+                  </a:outerShdw>
+                </a:effectLst>
+                <a:latin typeface="Calibri" pitchFamily="34" charset="0"/>
               </a:rPr>
               <a:t>Отпечатва в конзолата</a:t>
             </a:r>
-            <a:endParaRPr lang="bg-BG" dirty="0">
-              <a:solidFill>
-                <a:schemeClr val="tx1"/>
-              </a:solidFill>
-            </a:endParaRPr>
-          </a:p>
-        </p:txBody>
-      </p:sp>
-      <p:sp>
-        <p:nvSpPr>
-          <p:cNvPr id="18" name="TextBox 17"/>
-          <p:cNvSpPr txBox="1"/>
+          </a:p>
+        </p:txBody>
+      </p:sp>
+      <p:sp>
+        <p:nvSpPr>
+          <p:cNvPr id="14345" name="TextBox 17"/>
+          <p:cNvSpPr txBox="1">
+            <a:spLocks noChangeArrowheads="1"/>
+          </p:cNvSpPr>
           <p:nvPr/>
         </p:nvSpPr>
-        <p:spPr>
+        <p:spPr bwMode="auto">
           <a:xfrm>
-            <a:off x="6000760" y="1071546"/>
-            <a:ext cx="923010" cy="369332"/>
+            <a:off x="6665913" y="2992438"/>
+            <a:ext cx="917575" cy="366712"/>
           </a:xfrm>
           <a:prstGeom prst="rect">
             <a:avLst/>
           </a:prstGeom>
           <a:noFill/>
+          <a:ln w="9525">
+            <a:noFill/>
+            <a:miter lim="800000"/>
+            <a:headEnd/>
+            <a:tailEnd/>
+          </a:ln>
         </p:spPr>
         <p:txBody>
-          <a:bodyPr wrap="none" rtlCol="0">
+          <a:bodyPr wrap="none">
             <a:spAutoFit/>
           </a:bodyPr>
           <a:lstStyle/>
           <a:p>
             <a:r>
-              <a:rPr lang="en-US" b="1" dirty="0" smtClean="0"/>
+              <a:rPr lang="en-US" b="1">
+                <a:latin typeface="Calibri" pitchFamily="34" charset="0"/>
+              </a:rPr>
               <a:t>STDERR</a:t>
             </a:r>
-            <a:endParaRPr lang="bg-BG" b="1" dirty="0"/>
+            <a:endParaRPr lang="bg-BG" b="1">
+              <a:latin typeface="Calibri" pitchFamily="34" charset="0"/>
+            </a:endParaRPr>
           </a:p>
         </p:txBody>
       </p:sp>
       <p:sp>
         <p:nvSpPr>
           <p:cNvPr id="8" name="Rounded Rectangle 7"/>
-          <p:cNvSpPr/>
+          <p:cNvSpPr>
+            <a:spLocks noChangeArrowheads="1"/>
+          </p:cNvSpPr>
           <p:nvPr/>
         </p:nvSpPr>
-        <p:spPr>
+        <p:spPr bwMode="auto">
           <a:xfrm>
-            <a:off x="5715008" y="357166"/>
-            <a:ext cx="1571636" cy="571504"/>
+            <a:off x="6346825" y="2276475"/>
+            <a:ext cx="1571625" cy="571500"/>
           </a:xfrm>
           <a:prstGeom prst="roundRect">
-            <a:avLst/>
+            <a:avLst>
+              <a:gd name="adj" fmla="val 16667"/>
+            </a:avLst>
           </a:prstGeom>
           <a:solidFill>
-            <a:schemeClr val="accent1">
-              <a:lumMod val="40000"/>
-              <a:lumOff val="60000"/>
-            </a:schemeClr>
+            <a:srgbClr val="EAEAEA"/>
           </a:solidFill>
-          <a:ln>
+          <a:ln w="25400" algn="ctr">
             <a:solidFill>
-              <a:schemeClr val="tx2">
-                <a:lumMod val="40000"/>
-                <a:lumOff val="60000"/>
-              </a:schemeClr>
+              <a:schemeClr val="tx1"/>
             </a:solidFill>
+            <a:round/>
+            <a:headEnd/>
+            <a:tailEnd/>
           </a:ln>
         </p:spPr>
-        <p:style>
-          <a:lnRef idx="2">
-            <a:schemeClr val="accent1">
-              <a:shade val="50000"/>
-            </a:schemeClr>
-          </a:lnRef>
-          <a:fillRef idx="1">
-            <a:schemeClr val="accent1"/>
-          </a:fillRef>
-          <a:effectRef idx="0">
-            <a:schemeClr val="accent1"/>
-          </a:effectRef>
-          <a:fontRef idx="minor">
-            <a:schemeClr val="lt1"/>
-          </a:fontRef>
-        </p:style>
-        <p:txBody>
-          <a:bodyPr rtlCol="0" anchor="ctr"/>
+        <p:txBody>
+          <a:bodyPr anchor="ctr"/>
           <a:lstStyle/>
           <a:p>
             <a:pPr algn="ctr"/>
             <a:r>
-              <a:rPr lang="bg-BG" dirty="0" smtClean="0">
-                <a:solidFill>
-                  <a:schemeClr val="tx1"/>
-                </a:solidFill>
+              <a:rPr lang="bg-BG" b="1">
+                <a:effectLst>
+                  <a:outerShdw blurRad="38100" dist="38100" dir="2700000" algn="tl">
+                    <a:srgbClr val="FFFFFF"/>
+                  </a:outerShdw>
+                </a:effectLst>
+                <a:latin typeface="Calibri" pitchFamily="34" charset="0"/>
               </a:rPr>
               <a:t>Отпечатва в конзолата</a:t>
             </a:r>
-            <a:endParaRPr lang="bg-BG" dirty="0">
-              <a:solidFill>
-                <a:schemeClr val="tx1"/>
-              </a:solidFill>
-            </a:endParaRPr>
-          </a:p>
-        </p:txBody>
-      </p:sp>
-      <p:sp>
-        <p:nvSpPr>
-          <p:cNvPr id="19" name="TextBox 18"/>
-          <p:cNvSpPr txBox="1"/>
+          </a:p>
+        </p:txBody>
+      </p:sp>
+      <p:sp>
+        <p:nvSpPr>
+          <p:cNvPr id="14347" name="TextBox 18"/>
+          <p:cNvSpPr txBox="1">
+            <a:spLocks noChangeArrowheads="1"/>
+          </p:cNvSpPr>
           <p:nvPr/>
         </p:nvSpPr>
-        <p:spPr>
+        <p:spPr bwMode="auto">
           <a:xfrm>
-            <a:off x="6000760" y="0"/>
-            <a:ext cx="971100" cy="369332"/>
+            <a:off x="6665913" y="1920875"/>
+            <a:ext cx="965200" cy="366713"/>
           </a:xfrm>
           <a:prstGeom prst="rect">
             <a:avLst/>
           </a:prstGeom>
           <a:noFill/>
+          <a:ln w="9525">
+            <a:noFill/>
+            <a:miter lim="800000"/>
+            <a:headEnd/>
+            <a:tailEnd/>
+          </a:ln>
         </p:spPr>
         <p:txBody>
-          <a:bodyPr wrap="none" rtlCol="0">
+          <a:bodyPr wrap="none">
             <a:spAutoFit/>
           </a:bodyPr>
           <a:lstStyle/>
           <a:p>
             <a:r>
-              <a:rPr lang="en-US" b="1" dirty="0" smtClean="0"/>
+              <a:rPr lang="en-US" b="1">
+                <a:latin typeface="Calibri" pitchFamily="34" charset="0"/>
+              </a:rPr>
               <a:t>STDOUT</a:t>
             </a:r>
-            <a:endParaRPr lang="bg-BG" b="1" dirty="0"/>
+            <a:endParaRPr lang="bg-BG" b="1">
+              <a:latin typeface="Calibri" pitchFamily="34" charset="0"/>
+            </a:endParaRPr>
           </a:p>
         </p:txBody>
       </p:sp>
       <p:cxnSp>
         <p:nvCxnSpPr>
           <p:cNvPr id="21" name="Straight Arrow Connector 20"/>
-          <p:cNvCxnSpPr/>
+          <p:cNvCxnSpPr>
+            <a:cxnSpLocks noChangeShapeType="1"/>
+          </p:cNvCxnSpPr>
           <p:nvPr/>
         </p:nvCxnSpPr>
-        <p:spPr>
+        <p:spPr bwMode="auto">
           <a:xfrm rot="5400000" flipH="1" flipV="1">
-            <a:off x="4643438" y="928670"/>
-            <a:ext cx="1214446" cy="785818"/>
+            <a:off x="5308600" y="2849563"/>
+            <a:ext cx="1214438" cy="785812"/>
           </a:xfrm>
           <a:prstGeom prst="straightConnector1">
             <a:avLst/>
           </a:prstGeom>
-          <a:ln w="28575">
-            <a:tailEnd type="arrow"/>
+          <a:noFill/>
+          <a:ln w="28575" algn="ctr">
+            <a:solidFill>
+              <a:schemeClr val="tx1"/>
+            </a:solidFill>
+            <a:round/>
+            <a:headEnd/>
+            <a:tailEnd type="arrow" w="med" len="med"/>
           </a:ln>
         </p:spPr>
-        <p:style>
-          <a:lnRef idx="1">
-            <a:schemeClr val="accent1"/>
-          </a:lnRef>
-          <a:fillRef idx="0">
-            <a:schemeClr val="accent1"/>
-          </a:fillRef>
-          <a:effectRef idx="0">
-            <a:schemeClr val="accent1"/>
-          </a:effectRef>
-          <a:fontRef idx="minor">
-            <a:schemeClr val="tx1"/>
-          </a:fontRef>
-        </p:style>
       </p:cxnSp>
       <p:cxnSp>
         <p:nvCxnSpPr>
           <p:cNvPr id="24" name="Straight Arrow Connector 23"/>
-          <p:cNvCxnSpPr/>
+          <p:cNvCxnSpPr>
+            <a:cxnSpLocks noChangeShapeType="1"/>
+          </p:cNvCxnSpPr>
           <p:nvPr/>
         </p:nvCxnSpPr>
-        <p:spPr>
+        <p:spPr bwMode="auto">
           <a:xfrm>
-            <a:off x="5286380" y="1643050"/>
-            <a:ext cx="357190" cy="71438"/>
+            <a:off x="5951538" y="3563938"/>
+            <a:ext cx="357187" cy="71437"/>
           </a:xfrm>
           <a:prstGeom prst="straightConnector1">
             <a:avLst/>
           </a:prstGeom>
-          <a:ln w="28575">
-            <a:tailEnd type="arrow"/>
+          <a:noFill/>
+          <a:ln w="28575" algn="ctr">
+            <a:solidFill>
+              <a:schemeClr val="tx1"/>
+            </a:solidFill>
+            <a:round/>
+            <a:headEnd/>
+            <a:tailEnd type="arrow" w="med" len="med"/>
           </a:ln>
         </p:spPr>
-        <p:style>
-          <a:lnRef idx="1">
-            <a:schemeClr val="accent1"/>
-          </a:lnRef>
-          <a:fillRef idx="0">
-            <a:schemeClr val="accent1"/>
-          </a:fillRef>
-          <a:effectRef idx="0">
-            <a:schemeClr val="accent1"/>
-          </a:effectRef>
-          <a:fontRef idx="minor">
-            <a:schemeClr val="tx1"/>
-          </a:fontRef>
-        </p:style>
-      </p:cxnSp>
-      <p:sp>
-        <p:nvSpPr>
-          <p:cNvPr id="12" name="Rounded Rectangle 11"/>
-          <p:cNvSpPr/>
-          <p:nvPr/>
-        </p:nvSpPr>
-        <p:spPr>
-          <a:xfrm>
-            <a:off x="428596" y="3143248"/>
-            <a:ext cx="1571636" cy="571504"/>
-          </a:xfrm>
-          <a:prstGeom prst="roundRect">
-            <a:avLst/>
-          </a:prstGeom>
-          <a:solidFill>
-            <a:schemeClr val="accent1">
-              <a:lumMod val="40000"/>
-              <a:lumOff val="60000"/>
-            </a:schemeClr>
-          </a:solidFill>
-          <a:ln>
-            <a:solidFill>
-              <a:schemeClr val="tx2">
-                <a:lumMod val="40000"/>
-                <a:lumOff val="60000"/>
-              </a:schemeClr>
-            </a:solidFill>
-          </a:ln>
-        </p:spPr>
-        <p:style>
-          <a:lnRef idx="2">
-            <a:schemeClr val="accent1">
-              <a:shade val="50000"/>
-            </a:schemeClr>
-          </a:lnRef>
-          <a:fillRef idx="1">
-            <a:schemeClr val="accent1"/>
-          </a:fillRef>
-          <a:effectRef idx="0">
-            <a:schemeClr val="accent1"/>
-          </a:effectRef>
-          <a:fontRef idx="minor">
-            <a:schemeClr val="lt1"/>
-          </a:fontRef>
-        </p:style>
-        <p:txBody>
-          <a:bodyPr rtlCol="0" anchor="ctr"/>
-          <a:lstStyle/>
-          <a:p>
-            <a:pPr algn="ctr"/>
-            <a:r>
-              <a:rPr lang="bg-BG" dirty="0" smtClean="0">
-                <a:solidFill>
-                  <a:schemeClr val="tx1"/>
-                </a:solidFill>
-              </a:rPr>
-              <a:t>Клавиатурата</a:t>
-            </a:r>
-            <a:endParaRPr lang="bg-BG" dirty="0">
-              <a:solidFill>
-                <a:schemeClr val="tx1"/>
-              </a:solidFill>
-            </a:endParaRPr>
-          </a:p>
-        </p:txBody>
-      </p:sp>
-      <p:cxnSp>
-        <p:nvCxnSpPr>
-          <p:cNvPr id="23" name="Straight Arrow Connector 22"/>
-          <p:cNvCxnSpPr>
-            <a:endCxn id="33" idx="1"/>
-          </p:cNvCxnSpPr>
-          <p:nvPr/>
-        </p:nvCxnSpPr>
-        <p:spPr>
-          <a:xfrm>
-            <a:off x="2000232" y="3500438"/>
-            <a:ext cx="928694" cy="392909"/>
-          </a:xfrm>
-          <a:prstGeom prst="straightConnector1">
-            <a:avLst/>
-          </a:prstGeom>
-          <a:ln w="28575">
-            <a:tailEnd type="arrow"/>
-          </a:ln>
-        </p:spPr>
-        <p:style>
-          <a:lnRef idx="1">
-            <a:schemeClr val="accent1"/>
-          </a:lnRef>
-          <a:fillRef idx="0">
-            <a:schemeClr val="accent1"/>
-          </a:fillRef>
-          <a:effectRef idx="0">
-            <a:schemeClr val="accent1"/>
-          </a:effectRef>
-          <a:fontRef idx="minor">
-            <a:schemeClr val="tx1"/>
-          </a:fontRef>
-        </p:style>
-      </p:cxnSp>
-      <p:cxnSp>
-        <p:nvCxnSpPr>
-          <p:cNvPr id="26" name="Straight Arrow Connector 25"/>
-          <p:cNvCxnSpPr/>
-          <p:nvPr/>
-        </p:nvCxnSpPr>
-        <p:spPr>
-          <a:xfrm flipV="1">
-            <a:off x="1553745" y="4071942"/>
-            <a:ext cx="1375181" cy="500066"/>
-          </a:xfrm>
-          <a:prstGeom prst="straightConnector1">
-            <a:avLst/>
-          </a:prstGeom>
-          <a:ln w="28575">
-            <a:tailEnd type="arrow"/>
-          </a:ln>
-        </p:spPr>
-        <p:style>
-          <a:lnRef idx="1">
-            <a:schemeClr val="accent1"/>
-          </a:lnRef>
-          <a:fillRef idx="0">
-            <a:schemeClr val="accent1"/>
-          </a:fillRef>
-          <a:effectRef idx="0">
-            <a:schemeClr val="accent1"/>
-          </a:effectRef>
-          <a:fontRef idx="minor">
-            <a:schemeClr val="tx1"/>
-          </a:fontRef>
-        </p:style>
-      </p:cxnSp>
-      <p:sp>
-        <p:nvSpPr>
-          <p:cNvPr id="31" name="Bevel 30"/>
-          <p:cNvSpPr/>
-          <p:nvPr/>
-        </p:nvSpPr>
-        <p:spPr>
-          <a:xfrm>
-            <a:off x="6000760" y="3214686"/>
-            <a:ext cx="1785950" cy="1071570"/>
-          </a:xfrm>
-          <a:prstGeom prst="bevel">
-            <a:avLst/>
-          </a:prstGeom>
-          <a:solidFill>
-            <a:schemeClr val="accent1">
-              <a:lumMod val="40000"/>
-              <a:lumOff val="60000"/>
-            </a:schemeClr>
-          </a:solidFill>
-        </p:spPr>
-        <p:style>
-          <a:lnRef idx="2">
-            <a:schemeClr val="accent1">
-              <a:shade val="50000"/>
-            </a:schemeClr>
-          </a:lnRef>
-          <a:fillRef idx="1">
-            <a:schemeClr val="accent1"/>
-          </a:fillRef>
-          <a:effectRef idx="0">
-            <a:schemeClr val="accent1"/>
-          </a:effectRef>
-          <a:fontRef idx="minor">
-            <a:schemeClr val="lt1"/>
-          </a:fontRef>
-        </p:style>
-        <p:txBody>
-          <a:bodyPr rtlCol="0" anchor="ctr"/>
-          <a:lstStyle/>
-          <a:p>
-            <a:pPr algn="ctr"/>
-            <a:r>
-              <a:rPr lang="bg-BG" dirty="0" smtClean="0">
-                <a:solidFill>
-                  <a:schemeClr val="tx1"/>
-                </a:solidFill>
-              </a:rPr>
-              <a:t>Отпечатване на Екран</a:t>
-            </a:r>
-            <a:endParaRPr lang="bg-BG" dirty="0">
-              <a:solidFill>
-                <a:schemeClr val="tx1"/>
-              </a:solidFill>
-            </a:endParaRPr>
-          </a:p>
-        </p:txBody>
-      </p:sp>
-      <p:sp>
-        <p:nvSpPr>
-          <p:cNvPr id="32" name="Flowchart: Magnetic Disk 31"/>
-          <p:cNvSpPr/>
-          <p:nvPr/>
-        </p:nvSpPr>
-        <p:spPr>
-          <a:xfrm>
-            <a:off x="642910" y="4214818"/>
-            <a:ext cx="1071570" cy="714380"/>
-          </a:xfrm>
-          <a:prstGeom prst="flowChartMagneticDisk">
-            <a:avLst/>
-          </a:prstGeom>
-          <a:solidFill>
-            <a:schemeClr val="accent1">
-              <a:lumMod val="40000"/>
-              <a:lumOff val="60000"/>
-            </a:schemeClr>
-          </a:solidFill>
-          <a:ln>
-            <a:solidFill>
-              <a:schemeClr val="accent1">
-                <a:lumMod val="60000"/>
-                <a:lumOff val="40000"/>
-              </a:schemeClr>
-            </a:solidFill>
-          </a:ln>
-        </p:spPr>
-        <p:style>
-          <a:lnRef idx="2">
-            <a:schemeClr val="accent1">
-              <a:shade val="50000"/>
-            </a:schemeClr>
-          </a:lnRef>
-          <a:fillRef idx="1">
-            <a:schemeClr val="accent1"/>
-          </a:fillRef>
-          <a:effectRef idx="0">
-            <a:schemeClr val="accent1"/>
-          </a:effectRef>
-          <a:fontRef idx="minor">
-            <a:schemeClr val="lt1"/>
-          </a:fontRef>
-        </p:style>
-        <p:txBody>
-          <a:bodyPr rtlCol="0" anchor="ctr"/>
-          <a:lstStyle/>
-          <a:p>
-            <a:pPr algn="ctr"/>
-            <a:r>
-              <a:rPr lang="bg-BG" dirty="0" smtClean="0">
-                <a:solidFill>
-                  <a:schemeClr val="tx1"/>
-                </a:solidFill>
-              </a:rPr>
-              <a:t>Файл</a:t>
-            </a:r>
-            <a:endParaRPr lang="bg-BG" dirty="0">
-              <a:solidFill>
-                <a:schemeClr val="tx1"/>
-              </a:solidFill>
-            </a:endParaRPr>
-          </a:p>
-        </p:txBody>
-      </p:sp>
-      <p:sp>
-        <p:nvSpPr>
-          <p:cNvPr id="33" name="Flowchart: Multidocument 32"/>
-          <p:cNvSpPr/>
-          <p:nvPr/>
-        </p:nvSpPr>
-        <p:spPr>
-          <a:xfrm>
-            <a:off x="2928926" y="3286124"/>
-            <a:ext cx="2143140" cy="1214446"/>
-          </a:xfrm>
-          <a:prstGeom prst="flowChartMultidocument">
-            <a:avLst/>
-          </a:prstGeom>
-          <a:solidFill>
-            <a:schemeClr val="accent1">
-              <a:lumMod val="40000"/>
-              <a:lumOff val="60000"/>
-            </a:schemeClr>
-          </a:solidFill>
-        </p:spPr>
-        <p:style>
-          <a:lnRef idx="2">
-            <a:schemeClr val="accent1">
-              <a:shade val="50000"/>
-            </a:schemeClr>
-          </a:lnRef>
-          <a:fillRef idx="1">
-            <a:schemeClr val="accent1"/>
-          </a:fillRef>
-          <a:effectRef idx="0">
-            <a:schemeClr val="accent1"/>
-          </a:effectRef>
-          <a:fontRef idx="minor">
-            <a:schemeClr val="lt1"/>
-          </a:fontRef>
-        </p:style>
-        <p:txBody>
-          <a:bodyPr rtlCol="0" anchor="ctr"/>
-          <a:lstStyle/>
-          <a:p>
-            <a:pPr algn="ctr"/>
-            <a:r>
-              <a:rPr lang="bg-BG" dirty="0" smtClean="0">
-                <a:solidFill>
-                  <a:schemeClr val="tx1"/>
-                </a:solidFill>
-              </a:rPr>
-              <a:t>Програма</a:t>
-            </a:r>
-            <a:endParaRPr lang="en-US" dirty="0" smtClean="0">
-              <a:solidFill>
-                <a:schemeClr val="tx1"/>
-              </a:solidFill>
-            </a:endParaRPr>
-          </a:p>
-        </p:txBody>
-      </p:sp>
-      <p:cxnSp>
-        <p:nvCxnSpPr>
-          <p:cNvPr id="36" name="Straight Arrow Connector 35"/>
-          <p:cNvCxnSpPr/>
-          <p:nvPr/>
-        </p:nvCxnSpPr>
-        <p:spPr>
-          <a:xfrm flipV="1">
-            <a:off x="5072066" y="3750470"/>
-            <a:ext cx="928694" cy="0"/>
-          </a:xfrm>
-          <a:prstGeom prst="straightConnector1">
-            <a:avLst/>
-          </a:prstGeom>
-          <a:ln w="28575">
-            <a:tailEnd type="arrow"/>
-          </a:ln>
-        </p:spPr>
-        <p:style>
-          <a:lnRef idx="1">
-            <a:schemeClr val="accent1"/>
-          </a:lnRef>
-          <a:fillRef idx="0">
-            <a:schemeClr val="accent1"/>
-          </a:fillRef>
-          <a:effectRef idx="0">
-            <a:schemeClr val="accent1"/>
-          </a:effectRef>
-          <a:fontRef idx="minor">
-            <a:schemeClr val="tx1"/>
-          </a:fontRef>
-        </p:style>
       </p:cxnSp>
     </p:spTree>
   </p:cSld>

</xml_diff>